<commit_message>
Updated presentation to the actual class presentation
</commit_message>
<xml_diff>
--- a/debuggers.pptx
+++ b/debuggers.pptx
@@ -5,7 +5,7 @@
     <p:sldMasterId id="2147483696" r:id="rId1"/>
   </p:sldMasterIdLst>
   <p:notesMasterIdLst>
-    <p:notesMasterId r:id="rId33"/>
+    <p:notesMasterId r:id="rId31"/>
   </p:notesMasterIdLst>
   <p:sldIdLst>
     <p:sldId id="256" r:id="rId2"/>
@@ -21,24 +21,22 @@
     <p:sldId id="286" r:id="rId12"/>
     <p:sldId id="266" r:id="rId13"/>
     <p:sldId id="267" r:id="rId14"/>
-    <p:sldId id="268" r:id="rId15"/>
-    <p:sldId id="269" r:id="rId16"/>
-    <p:sldId id="270" r:id="rId17"/>
-    <p:sldId id="271" r:id="rId18"/>
-    <p:sldId id="272" r:id="rId19"/>
-    <p:sldId id="273" r:id="rId20"/>
-    <p:sldId id="274" r:id="rId21"/>
-    <p:sldId id="275" r:id="rId22"/>
-    <p:sldId id="278" r:id="rId23"/>
-    <p:sldId id="276" r:id="rId24"/>
-    <p:sldId id="277" r:id="rId25"/>
-    <p:sldId id="279" r:id="rId26"/>
-    <p:sldId id="280" r:id="rId27"/>
-    <p:sldId id="281" r:id="rId28"/>
-    <p:sldId id="282" r:id="rId29"/>
-    <p:sldId id="283" r:id="rId30"/>
-    <p:sldId id="284" r:id="rId31"/>
-    <p:sldId id="285" r:id="rId32"/>
+    <p:sldId id="269" r:id="rId15"/>
+    <p:sldId id="270" r:id="rId16"/>
+    <p:sldId id="271" r:id="rId17"/>
+    <p:sldId id="272" r:id="rId18"/>
+    <p:sldId id="273" r:id="rId19"/>
+    <p:sldId id="275" r:id="rId20"/>
+    <p:sldId id="278" r:id="rId21"/>
+    <p:sldId id="276" r:id="rId22"/>
+    <p:sldId id="277" r:id="rId23"/>
+    <p:sldId id="279" r:id="rId24"/>
+    <p:sldId id="280" r:id="rId25"/>
+    <p:sldId id="281" r:id="rId26"/>
+    <p:sldId id="282" r:id="rId27"/>
+    <p:sldId id="283" r:id="rId28"/>
+    <p:sldId id="284" r:id="rId29"/>
+    <p:sldId id="285" r:id="rId30"/>
   </p:sldIdLst>
   <p:sldSz cx="12192000" cy="6858000"/>
   <p:notesSz cx="6858000" cy="9144000"/>
@@ -163,13 +161,11 @@
             <p14:sldId id="286"/>
             <p14:sldId id="266"/>
             <p14:sldId id="267"/>
-            <p14:sldId id="268"/>
             <p14:sldId id="269"/>
             <p14:sldId id="270"/>
             <p14:sldId id="271"/>
             <p14:sldId id="272"/>
             <p14:sldId id="273"/>
-            <p14:sldId id="274"/>
             <p14:sldId id="275"/>
             <p14:sldId id="278"/>
             <p14:sldId id="276"/>
@@ -185,765 +181,45 @@
         </p14:section>
       </p14:sectionLst>
     </p:ext>
+    <p:ext uri="{EFAFB233-063F-42B5-8137-9DF3F51BA10A}">
+      <p15:sldGuideLst xmlns:p15="http://schemas.microsoft.com/office/powerpoint/2012/main"/>
+    </p:ext>
   </p:extLst>
 </p:presentation>
+</file>
+
+<file path=ppt/revisionInfo.xml><?xml version="1.0" encoding="utf-8"?>
+<p1510:revInfo xmlns:a="http://schemas.openxmlformats.org/drawingml/2006/main" xmlns:r="http://schemas.openxmlformats.org/officeDocument/2006/relationships" xmlns:p1510="http://schemas.microsoft.com/office/powerpoint/2015/10/main">
+  <p1510:revLst>
+    <p1510:client id="{E07EA255-8232-44D9-B308-6D05CC31048C}" v="6" dt="2018-07-18T02:35:29.166"/>
+  </p1510:revLst>
+</p1510:revInfo>
 </file>
 
 <file path=ppt/changesInfos/changesInfo1.xml><?xml version="1.0" encoding="utf-8"?>
 <pc:chgInfo xmlns:a="http://schemas.openxmlformats.org/drawingml/2006/main" xmlns:r="http://schemas.openxmlformats.org/officeDocument/2006/relationships" xmlns:ac="http://schemas.microsoft.com/office/drawing/2013/main/command" xmlns:pc="http://schemas.microsoft.com/office/powerpoint/2013/main/command">
   <pc:docChgLst>
     <pc:chgData name="Jakob Erzar" userId="18a895aab62a8440" providerId="LiveId" clId="{9229E343-FD06-43D4-B292-7433C8E7B9CE}"/>
-    <pc:docChg chg="undo custSel addSld modSld sldOrd">
-      <pc:chgData name="Jakob Erzar" userId="18a895aab62a8440" providerId="LiveId" clId="{9229E343-FD06-43D4-B292-7433C8E7B9CE}" dt="2018-01-10T13:01:11.188" v="3902" actId="20577"/>
+  </pc:docChgLst>
+  <pc:docChgLst>
+    <pc:chgData name="Jakob Erzar" userId="18a895aab62a8440" providerId="LiveId" clId="{E07EA255-8232-44D9-B308-6D05CC31048C}"/>
+    <pc:docChg chg="modSld">
+      <pc:chgData name="Jakob Erzar" userId="18a895aab62a8440" providerId="LiveId" clId="{E07EA255-8232-44D9-B308-6D05CC31048C}" dt="2018-07-18T02:35:29.166" v="5" actId="20577"/>
       <pc:docMkLst>
         <pc:docMk/>
       </pc:docMkLst>
       <pc:sldChg chg="modSp">
-        <pc:chgData name="Jakob Erzar" userId="18a895aab62a8440" providerId="LiveId" clId="{9229E343-FD06-43D4-B292-7433C8E7B9CE}" dt="2018-01-10T12:56:37.630" v="3703" actId="27636"/>
-        <pc:sldMkLst>
-          <pc:docMk/>
-          <pc:sldMk cId="3167584517" sldId="259"/>
-        </pc:sldMkLst>
-        <pc:spChg chg="mod">
-          <ac:chgData name="Jakob Erzar" userId="18a895aab62a8440" providerId="LiveId" clId="{9229E343-FD06-43D4-B292-7433C8E7B9CE}" dt="2018-01-10T12:56:37.630" v="3703" actId="27636"/>
-          <ac:spMkLst>
-            <pc:docMk/>
-            <pc:sldMk cId="3167584517" sldId="259"/>
-            <ac:spMk id="3" creationId="{66899577-5F18-4BC0-B18A-CEEC13DDDE2E}"/>
-          </ac:spMkLst>
-        </pc:spChg>
-      </pc:sldChg>
-      <pc:sldChg chg="modSp add">
-        <pc:chgData name="Jakob Erzar" userId="18a895aab62a8440" providerId="LiveId" clId="{9229E343-FD06-43D4-B292-7433C8E7B9CE}" dt="2018-01-10T12:59:52.201" v="3732" actId="20577"/>
-        <pc:sldMkLst>
-          <pc:docMk/>
-          <pc:sldMk cId="3568211396" sldId="261"/>
-        </pc:sldMkLst>
-        <pc:spChg chg="mod">
-          <ac:chgData name="Jakob Erzar" userId="18a895aab62a8440" providerId="LiveId" clId="{9229E343-FD06-43D4-B292-7433C8E7B9CE}" dt="2018-01-10T11:27:36.657" v="28" actId="20577"/>
-          <ac:spMkLst>
-            <pc:docMk/>
-            <pc:sldMk cId="3568211396" sldId="261"/>
-            <ac:spMk id="2" creationId="{4590E022-6309-4C86-9930-0117CA88874B}"/>
-          </ac:spMkLst>
-        </pc:spChg>
-        <pc:spChg chg="mod">
-          <ac:chgData name="Jakob Erzar" userId="18a895aab62a8440" providerId="LiveId" clId="{9229E343-FD06-43D4-B292-7433C8E7B9CE}" dt="2018-01-10T12:59:52.201" v="3732" actId="20577"/>
-          <ac:spMkLst>
-            <pc:docMk/>
-            <pc:sldMk cId="3568211396" sldId="261"/>
-            <ac:spMk id="3" creationId="{D5EFC4D9-F2EA-4BFD-AD2D-1FBB0FD0E6B7}"/>
-          </ac:spMkLst>
-        </pc:spChg>
-      </pc:sldChg>
-      <pc:sldChg chg="addSp modSp add">
-        <pc:chgData name="Jakob Erzar" userId="18a895aab62a8440" providerId="LiveId" clId="{9229E343-FD06-43D4-B292-7433C8E7B9CE}" dt="2018-01-10T11:37:56.963" v="339" actId="1076"/>
-        <pc:sldMkLst>
-          <pc:docMk/>
-          <pc:sldMk cId="2462963912" sldId="262"/>
-        </pc:sldMkLst>
-        <pc:spChg chg="mod">
-          <ac:chgData name="Jakob Erzar" userId="18a895aab62a8440" providerId="LiveId" clId="{9229E343-FD06-43D4-B292-7433C8E7B9CE}" dt="2018-01-10T11:31:19.700" v="168" actId="20577"/>
-          <ac:spMkLst>
-            <pc:docMk/>
-            <pc:sldMk cId="2462963912" sldId="262"/>
-            <ac:spMk id="2" creationId="{E16F929D-A2B0-45DA-9FF0-4E2F23CD9C18}"/>
-          </ac:spMkLst>
-        </pc:spChg>
-        <pc:spChg chg="mod">
-          <ac:chgData name="Jakob Erzar" userId="18a895aab62a8440" providerId="LiveId" clId="{9229E343-FD06-43D4-B292-7433C8E7B9CE}" dt="2018-01-10T11:37:51.312" v="337" actId="27636"/>
-          <ac:spMkLst>
-            <pc:docMk/>
-            <pc:sldMk cId="2462963912" sldId="262"/>
-            <ac:spMk id="3" creationId="{9D02FCDF-91C8-4487-9FA0-A6F1B0490537}"/>
-          </ac:spMkLst>
-        </pc:spChg>
-        <pc:picChg chg="add mod">
-          <ac:chgData name="Jakob Erzar" userId="18a895aab62a8440" providerId="LiveId" clId="{9229E343-FD06-43D4-B292-7433C8E7B9CE}" dt="2018-01-10T11:37:56.963" v="339" actId="1076"/>
-          <ac:picMkLst>
-            <pc:docMk/>
-            <pc:sldMk cId="2462963912" sldId="262"/>
-            <ac:picMk id="5" creationId="{12096DCE-70A9-4933-B1B7-FFDF603A4693}"/>
-          </ac:picMkLst>
-        </pc:picChg>
-      </pc:sldChg>
-      <pc:sldChg chg="modSp add">
-        <pc:chgData name="Jakob Erzar" userId="18a895aab62a8440" providerId="LiveId" clId="{9229E343-FD06-43D4-B292-7433C8E7B9CE}" dt="2018-01-10T11:35:15.684" v="297" actId="20577"/>
-        <pc:sldMkLst>
-          <pc:docMk/>
-          <pc:sldMk cId="3455869133" sldId="263"/>
-        </pc:sldMkLst>
-        <pc:spChg chg="mod">
-          <ac:chgData name="Jakob Erzar" userId="18a895aab62a8440" providerId="LiveId" clId="{9229E343-FD06-43D4-B292-7433C8E7B9CE}" dt="2018-01-10T11:34:29.245" v="257" actId="20577"/>
-          <ac:spMkLst>
-            <pc:docMk/>
-            <pc:sldMk cId="3455869133" sldId="263"/>
-            <ac:spMk id="2" creationId="{D3E8B5E1-E46E-4E8C-921E-28D37EE973BB}"/>
-          </ac:spMkLst>
-        </pc:spChg>
-        <pc:spChg chg="mod">
-          <ac:chgData name="Jakob Erzar" userId="18a895aab62a8440" providerId="LiveId" clId="{9229E343-FD06-43D4-B292-7433C8E7B9CE}" dt="2018-01-10T11:35:15.684" v="297" actId="20577"/>
-          <ac:spMkLst>
-            <pc:docMk/>
-            <pc:sldMk cId="3455869133" sldId="263"/>
-            <ac:spMk id="3" creationId="{6F58CB2C-91E0-4B42-89CB-31B32F18686E}"/>
-          </ac:spMkLst>
-        </pc:spChg>
-      </pc:sldChg>
-      <pc:sldChg chg="addSp delSp modSp add">
-        <pc:chgData name="Jakob Erzar" userId="18a895aab62a8440" providerId="LiveId" clId="{9229E343-FD06-43D4-B292-7433C8E7B9CE}" dt="2018-01-10T11:39:04.937" v="355" actId="27636"/>
-        <pc:sldMkLst>
-          <pc:docMk/>
-          <pc:sldMk cId="4193987738" sldId="264"/>
-        </pc:sldMkLst>
-        <pc:spChg chg="mod">
-          <ac:chgData name="Jakob Erzar" userId="18a895aab62a8440" providerId="LiveId" clId="{9229E343-FD06-43D4-B292-7433C8E7B9CE}" dt="2018-01-10T11:35:31.340" v="313" actId="20577"/>
-          <ac:spMkLst>
-            <pc:docMk/>
-            <pc:sldMk cId="4193987738" sldId="264"/>
-            <ac:spMk id="2" creationId="{80F7BE2E-EC34-4AB8-AEB3-348ABA0B655F}"/>
-          </ac:spMkLst>
-        </pc:spChg>
-        <pc:spChg chg="mod">
-          <ac:chgData name="Jakob Erzar" userId="18a895aab62a8440" providerId="LiveId" clId="{9229E343-FD06-43D4-B292-7433C8E7B9CE}" dt="2018-01-10T11:39:04.937" v="355" actId="27636"/>
-          <ac:spMkLst>
-            <pc:docMk/>
-            <pc:sldMk cId="4193987738" sldId="264"/>
-            <ac:spMk id="3" creationId="{538B0FC6-B665-447B-8412-5697CADD0EB9}"/>
-          </ac:spMkLst>
-        </pc:spChg>
-        <pc:picChg chg="add del mod">
-          <ac:chgData name="Jakob Erzar" userId="18a895aab62a8440" providerId="LiveId" clId="{9229E343-FD06-43D4-B292-7433C8E7B9CE}" dt="2018-01-10T11:38:05.790" v="340" actId="478"/>
-          <ac:picMkLst>
-            <pc:docMk/>
-            <pc:sldMk cId="4193987738" sldId="264"/>
-            <ac:picMk id="5" creationId="{405AE7C1-8283-452C-8A9A-6DBD9CB93053}"/>
-          </ac:picMkLst>
-        </pc:picChg>
-        <pc:picChg chg="add del mod">
-          <ac:chgData name="Jakob Erzar" userId="18a895aab62a8440" providerId="LiveId" clId="{9229E343-FD06-43D4-B292-7433C8E7B9CE}" dt="2018-01-10T11:38:33.045" v="342" actId="478"/>
-          <ac:picMkLst>
-            <pc:docMk/>
-            <pc:sldMk cId="4193987738" sldId="264"/>
-            <ac:picMk id="7" creationId="{59F124DA-00C9-424E-86A5-A6028CCF2331}"/>
-          </ac:picMkLst>
-        </pc:picChg>
-        <pc:picChg chg="add del mod">
-          <ac:chgData name="Jakob Erzar" userId="18a895aab62a8440" providerId="LiveId" clId="{9229E343-FD06-43D4-B292-7433C8E7B9CE}" dt="2018-01-10T11:38:57.217" v="345" actId="478"/>
-          <ac:picMkLst>
-            <pc:docMk/>
-            <pc:sldMk cId="4193987738" sldId="264"/>
-            <ac:picMk id="9" creationId="{44AD5785-5B59-4599-8577-E47AD5B82CF0}"/>
-          </ac:picMkLst>
-        </pc:picChg>
-      </pc:sldChg>
-      <pc:sldChg chg="addSp delSp modSp add">
-        <pc:chgData name="Jakob Erzar" userId="18a895aab62a8440" providerId="LiveId" clId="{9229E343-FD06-43D4-B292-7433C8E7B9CE}" dt="2018-01-10T11:40:12.765" v="359"/>
-        <pc:sldMkLst>
-          <pc:docMk/>
-          <pc:sldMk cId="2450647931" sldId="265"/>
-        </pc:sldMkLst>
-        <pc:spChg chg="del">
-          <ac:chgData name="Jakob Erzar" userId="18a895aab62a8440" providerId="LiveId" clId="{9229E343-FD06-43D4-B292-7433C8E7B9CE}" dt="2018-01-10T11:40:07.318" v="357" actId="478"/>
-          <ac:spMkLst>
-            <pc:docMk/>
-            <pc:sldMk cId="2450647931" sldId="265"/>
-            <ac:spMk id="2" creationId="{28F1A098-F1C0-44F3-9A5A-F559412A354A}"/>
-          </ac:spMkLst>
-        </pc:spChg>
-        <pc:spChg chg="del">
-          <ac:chgData name="Jakob Erzar" userId="18a895aab62a8440" providerId="LiveId" clId="{9229E343-FD06-43D4-B292-7433C8E7B9CE}" dt="2018-01-10T11:40:10.419" v="358" actId="478"/>
-          <ac:spMkLst>
-            <pc:docMk/>
-            <pc:sldMk cId="2450647931" sldId="265"/>
-            <ac:spMk id="3" creationId="{DFB3E1B6-E3C6-4E12-A3D8-F2A7814BA64D}"/>
-          </ac:spMkLst>
-        </pc:spChg>
-        <pc:picChg chg="add mod">
-          <ac:chgData name="Jakob Erzar" userId="18a895aab62a8440" providerId="LiveId" clId="{9229E343-FD06-43D4-B292-7433C8E7B9CE}" dt="2018-01-10T11:40:12.765" v="359"/>
-          <ac:picMkLst>
-            <pc:docMk/>
-            <pc:sldMk cId="2450647931" sldId="265"/>
-            <ac:picMk id="5" creationId="{8F9E9C46-5930-4BC0-BB7C-6C404DB97F10}"/>
-          </ac:picMkLst>
-        </pc:picChg>
-      </pc:sldChg>
-      <pc:sldChg chg="addSp delSp modSp add">
-        <pc:chgData name="Jakob Erzar" userId="18a895aab62a8440" providerId="LiveId" clId="{9229E343-FD06-43D4-B292-7433C8E7B9CE}" dt="2018-01-10T11:43:39.635" v="468" actId="20577"/>
-        <pc:sldMkLst>
-          <pc:docMk/>
-          <pc:sldMk cId="535386252" sldId="266"/>
-        </pc:sldMkLst>
-        <pc:spChg chg="mod">
-          <ac:chgData name="Jakob Erzar" userId="18a895aab62a8440" providerId="LiveId" clId="{9229E343-FD06-43D4-B292-7433C8E7B9CE}" dt="2018-01-10T11:41:29.912" v="368" actId="20577"/>
-          <ac:spMkLst>
-            <pc:docMk/>
-            <pc:sldMk cId="535386252" sldId="266"/>
-            <ac:spMk id="2" creationId="{A37EEE22-9536-4BDA-BE24-69598A5D99FD}"/>
-          </ac:spMkLst>
-        </pc:spChg>
-        <pc:spChg chg="mod">
-          <ac:chgData name="Jakob Erzar" userId="18a895aab62a8440" providerId="LiveId" clId="{9229E343-FD06-43D4-B292-7433C8E7B9CE}" dt="2018-01-10T11:43:39.635" v="468" actId="20577"/>
-          <ac:spMkLst>
-            <pc:docMk/>
-            <pc:sldMk cId="535386252" sldId="266"/>
-            <ac:spMk id="3" creationId="{636347A3-C97D-48D5-A523-6274858EA248}"/>
-          </ac:spMkLst>
-        </pc:spChg>
-        <pc:spChg chg="add del">
-          <ac:chgData name="Jakob Erzar" userId="18a895aab62a8440" providerId="LiveId" clId="{9229E343-FD06-43D4-B292-7433C8E7B9CE}" dt="2018-01-10T11:42:12.976" v="448"/>
-          <ac:spMkLst>
-            <pc:docMk/>
-            <pc:sldMk cId="535386252" sldId="266"/>
-            <ac:spMk id="4" creationId="{421F64B0-5B80-4881-9F88-1EE1EB3D79EC}"/>
-          </ac:spMkLst>
-        </pc:spChg>
-        <pc:spChg chg="add del">
-          <ac:chgData name="Jakob Erzar" userId="18a895aab62a8440" providerId="LiveId" clId="{9229E343-FD06-43D4-B292-7433C8E7B9CE}" dt="2018-01-10T11:42:25.089" v="452"/>
-          <ac:spMkLst>
-            <pc:docMk/>
-            <pc:sldMk cId="535386252" sldId="266"/>
-            <ac:spMk id="5" creationId="{B71567F4-0727-4523-974C-3C6A7E35817A}"/>
-          </ac:spMkLst>
-        </pc:spChg>
-        <pc:spChg chg="add del">
-          <ac:chgData name="Jakob Erzar" userId="18a895aab62a8440" providerId="LiveId" clId="{9229E343-FD06-43D4-B292-7433C8E7B9CE}" dt="2018-01-10T11:42:27.387" v="456"/>
-          <ac:spMkLst>
-            <pc:docMk/>
-            <pc:sldMk cId="535386252" sldId="266"/>
-            <ac:spMk id="6" creationId="{21C21AB7-F846-4D0A-BB63-35179BE1C360}"/>
-          </ac:spMkLst>
-        </pc:spChg>
-      </pc:sldChg>
-      <pc:sldChg chg="modSp add">
-        <pc:chgData name="Jakob Erzar" userId="18a895aab62a8440" providerId="LiveId" clId="{9229E343-FD06-43D4-B292-7433C8E7B9CE}" dt="2018-01-10T11:46:05.549" v="644" actId="114"/>
-        <pc:sldMkLst>
-          <pc:docMk/>
-          <pc:sldMk cId="1609304195" sldId="267"/>
-        </pc:sldMkLst>
-        <pc:spChg chg="mod">
-          <ac:chgData name="Jakob Erzar" userId="18a895aab62a8440" providerId="LiveId" clId="{9229E343-FD06-43D4-B292-7433C8E7B9CE}" dt="2018-01-10T11:44:11.330" v="508" actId="20577"/>
-          <ac:spMkLst>
-            <pc:docMk/>
-            <pc:sldMk cId="1609304195" sldId="267"/>
-            <ac:spMk id="2" creationId="{5ECC76A1-A096-4A2C-92DA-E1DB8CB23609}"/>
-          </ac:spMkLst>
-        </pc:spChg>
-        <pc:spChg chg="mod">
-          <ac:chgData name="Jakob Erzar" userId="18a895aab62a8440" providerId="LiveId" clId="{9229E343-FD06-43D4-B292-7433C8E7B9CE}" dt="2018-01-10T11:46:05.549" v="644" actId="114"/>
-          <ac:spMkLst>
-            <pc:docMk/>
-            <pc:sldMk cId="1609304195" sldId="267"/>
-            <ac:spMk id="3" creationId="{9FF4E42F-EB58-476A-9289-3AA635EEF4C9}"/>
-          </ac:spMkLst>
-        </pc:spChg>
-      </pc:sldChg>
-      <pc:sldChg chg="modSp add">
-        <pc:chgData name="Jakob Erzar" userId="18a895aab62a8440" providerId="LiveId" clId="{9229E343-FD06-43D4-B292-7433C8E7B9CE}" dt="2018-01-10T11:47:04.211" v="683" actId="20577"/>
-        <pc:sldMkLst>
-          <pc:docMk/>
-          <pc:sldMk cId="3481417011" sldId="268"/>
-        </pc:sldMkLst>
-        <pc:spChg chg="mod">
-          <ac:chgData name="Jakob Erzar" userId="18a895aab62a8440" providerId="LiveId" clId="{9229E343-FD06-43D4-B292-7433C8E7B9CE}" dt="2018-01-10T11:46:49.425" v="660" actId="20577"/>
-          <ac:spMkLst>
-            <pc:docMk/>
-            <pc:sldMk cId="3481417011" sldId="268"/>
-            <ac:spMk id="2" creationId="{6576E4F7-645C-4D9D-870A-4188060FFF8F}"/>
-          </ac:spMkLst>
-        </pc:spChg>
-        <pc:spChg chg="mod">
-          <ac:chgData name="Jakob Erzar" userId="18a895aab62a8440" providerId="LiveId" clId="{9229E343-FD06-43D4-B292-7433C8E7B9CE}" dt="2018-01-10T11:47:04.211" v="683" actId="20577"/>
-          <ac:spMkLst>
-            <pc:docMk/>
-            <pc:sldMk cId="3481417011" sldId="268"/>
-            <ac:spMk id="3" creationId="{28FB93D1-4BC9-4D10-9D96-70C17A1B21B3}"/>
-          </ac:spMkLst>
-        </pc:spChg>
-      </pc:sldChg>
-      <pc:sldChg chg="addSp delSp modSp add">
-        <pc:chgData name="Jakob Erzar" userId="18a895aab62a8440" providerId="LiveId" clId="{9229E343-FD06-43D4-B292-7433C8E7B9CE}" dt="2018-01-10T11:48:38.429" v="727" actId="12385"/>
-        <pc:sldMkLst>
-          <pc:docMk/>
-          <pc:sldMk cId="2021768761" sldId="269"/>
-        </pc:sldMkLst>
-        <pc:spChg chg="mod">
-          <ac:chgData name="Jakob Erzar" userId="18a895aab62a8440" providerId="LiveId" clId="{9229E343-FD06-43D4-B292-7433C8E7B9CE}" dt="2018-01-10T11:47:20.239" v="717" actId="20577"/>
-          <ac:spMkLst>
-            <pc:docMk/>
-            <pc:sldMk cId="2021768761" sldId="269"/>
-            <ac:spMk id="2" creationId="{4EC8BA02-9A9E-40B3-9FA1-FA280FA65261}"/>
-          </ac:spMkLst>
-        </pc:spChg>
-        <pc:spChg chg="del">
-          <ac:chgData name="Jakob Erzar" userId="18a895aab62a8440" providerId="LiveId" clId="{9229E343-FD06-43D4-B292-7433C8E7B9CE}" dt="2018-01-10T11:47:32.827" v="718"/>
-          <ac:spMkLst>
-            <pc:docMk/>
-            <pc:sldMk cId="2021768761" sldId="269"/>
-            <ac:spMk id="3" creationId="{16333D36-4E92-4BC0-BF27-6DE85464C50F}"/>
-          </ac:spMkLst>
-        </pc:spChg>
-        <pc:graphicFrameChg chg="add mod modGraphic">
-          <ac:chgData name="Jakob Erzar" userId="18a895aab62a8440" providerId="LiveId" clId="{9229E343-FD06-43D4-B292-7433C8E7B9CE}" dt="2018-01-10T11:48:38.429" v="727" actId="12385"/>
-          <ac:graphicFrameMkLst>
-            <pc:docMk/>
-            <pc:sldMk cId="2021768761" sldId="269"/>
-            <ac:graphicFrameMk id="4" creationId="{1801723A-39DF-478B-AA36-F4EC4852D744}"/>
-          </ac:graphicFrameMkLst>
-        </pc:graphicFrameChg>
-      </pc:sldChg>
-      <pc:sldChg chg="addSp delSp modSp add">
-        <pc:chgData name="Jakob Erzar" userId="18a895aab62a8440" providerId="LiveId" clId="{9229E343-FD06-43D4-B292-7433C8E7B9CE}" dt="2018-01-10T11:50:37.407" v="814" actId="20577"/>
-        <pc:sldMkLst>
-          <pc:docMk/>
-          <pc:sldMk cId="907681658" sldId="270"/>
-        </pc:sldMkLst>
-        <pc:spChg chg="mod">
-          <ac:chgData name="Jakob Erzar" userId="18a895aab62a8440" providerId="LiveId" clId="{9229E343-FD06-43D4-B292-7433C8E7B9CE}" dt="2018-01-10T11:49:14.109" v="765" actId="20577"/>
-          <ac:spMkLst>
-            <pc:docMk/>
-            <pc:sldMk cId="907681658" sldId="270"/>
-            <ac:spMk id="2" creationId="{717BEDDE-460A-43C5-BDAB-532CBB87B35F}"/>
-          </ac:spMkLst>
-        </pc:spChg>
-        <pc:spChg chg="add del mod">
-          <ac:chgData name="Jakob Erzar" userId="18a895aab62a8440" providerId="LiveId" clId="{9229E343-FD06-43D4-B292-7433C8E7B9CE}" dt="2018-01-10T11:50:37.407" v="814" actId="20577"/>
-          <ac:spMkLst>
-            <pc:docMk/>
-            <pc:sldMk cId="907681658" sldId="270"/>
-            <ac:spMk id="3" creationId="{77BD6FF8-F1C0-4748-95A4-441AC155EC32}"/>
-          </ac:spMkLst>
-        </pc:spChg>
-        <pc:spChg chg="add del">
-          <ac:chgData name="Jakob Erzar" userId="18a895aab62a8440" providerId="LiveId" clId="{9229E343-FD06-43D4-B292-7433C8E7B9CE}" dt="2018-01-10T11:49:36.524" v="767"/>
-          <ac:spMkLst>
-            <pc:docMk/>
-            <pc:sldMk cId="907681658" sldId="270"/>
-            <ac:spMk id="4" creationId="{67EB50E7-C854-4F21-B8CB-3C3904923BC7}"/>
-          </ac:spMkLst>
-        </pc:spChg>
-        <pc:spChg chg="add del">
-          <ac:chgData name="Jakob Erzar" userId="18a895aab62a8440" providerId="LiveId" clId="{9229E343-FD06-43D4-B292-7433C8E7B9CE}" dt="2018-01-10T11:49:41.417" v="771"/>
-          <ac:spMkLst>
-            <pc:docMk/>
-            <pc:sldMk cId="907681658" sldId="270"/>
-            <ac:spMk id="5" creationId="{4A41C1A7-7932-4EAB-AC96-4562ECE31426}"/>
-          </ac:spMkLst>
-        </pc:spChg>
-      </pc:sldChg>
-      <pc:sldChg chg="modSp add">
-        <pc:chgData name="Jakob Erzar" userId="18a895aab62a8440" providerId="LiveId" clId="{9229E343-FD06-43D4-B292-7433C8E7B9CE}" dt="2018-01-10T12:28:54.123" v="1355" actId="20577"/>
-        <pc:sldMkLst>
-          <pc:docMk/>
-          <pc:sldMk cId="693203529" sldId="271"/>
-        </pc:sldMkLst>
-        <pc:spChg chg="mod">
-          <ac:chgData name="Jakob Erzar" userId="18a895aab62a8440" providerId="LiveId" clId="{9229E343-FD06-43D4-B292-7433C8E7B9CE}" dt="2018-01-10T11:51:37.721" v="820" actId="20577"/>
-          <ac:spMkLst>
-            <pc:docMk/>
-            <pc:sldMk cId="693203529" sldId="271"/>
-            <ac:spMk id="2" creationId="{A3450B84-8CB5-4E78-AFC4-4E515B387F07}"/>
-          </ac:spMkLst>
-        </pc:spChg>
-        <pc:spChg chg="mod">
-          <ac:chgData name="Jakob Erzar" userId="18a895aab62a8440" providerId="LiveId" clId="{9229E343-FD06-43D4-B292-7433C8E7B9CE}" dt="2018-01-10T12:28:54.123" v="1355" actId="20577"/>
-          <ac:spMkLst>
-            <pc:docMk/>
-            <pc:sldMk cId="693203529" sldId="271"/>
-            <ac:spMk id="3" creationId="{E1AD1311-F5FD-4565-961E-FDE71F9CE5E9}"/>
-          </ac:spMkLst>
-        </pc:spChg>
-      </pc:sldChg>
-      <pc:sldChg chg="addSp delSp modSp add">
-        <pc:chgData name="Jakob Erzar" userId="18a895aab62a8440" providerId="LiveId" clId="{9229E343-FD06-43D4-B292-7433C8E7B9CE}" dt="2018-01-10T12:23:35.742" v="1100" actId="20577"/>
-        <pc:sldMkLst>
-          <pc:docMk/>
-          <pc:sldMk cId="255726157" sldId="272"/>
-        </pc:sldMkLst>
-        <pc:spChg chg="mod">
-          <ac:chgData name="Jakob Erzar" userId="18a895aab62a8440" providerId="LiveId" clId="{9229E343-FD06-43D4-B292-7433C8E7B9CE}" dt="2018-01-10T11:53:50.607" v="945" actId="20577"/>
-          <ac:spMkLst>
-            <pc:docMk/>
-            <pc:sldMk cId="255726157" sldId="272"/>
-            <ac:spMk id="2" creationId="{C116077A-6C22-4AEF-A71C-5A44D6C83D89}"/>
-          </ac:spMkLst>
-        </pc:spChg>
-        <pc:spChg chg="add del mod">
-          <ac:chgData name="Jakob Erzar" userId="18a895aab62a8440" providerId="LiveId" clId="{9229E343-FD06-43D4-B292-7433C8E7B9CE}" dt="2018-01-10T12:23:35.742" v="1100" actId="20577"/>
-          <ac:spMkLst>
-            <pc:docMk/>
-            <pc:sldMk cId="255726157" sldId="272"/>
-            <ac:spMk id="3" creationId="{A2C6800B-430A-47F2-80D5-CF004C2F83D3}"/>
-          </ac:spMkLst>
-        </pc:spChg>
-        <pc:spChg chg="add del">
-          <ac:chgData name="Jakob Erzar" userId="18a895aab62a8440" providerId="LiveId" clId="{9229E343-FD06-43D4-B292-7433C8E7B9CE}" dt="2018-01-10T11:54:05.694" v="950"/>
-          <ac:spMkLst>
-            <pc:docMk/>
-            <pc:sldMk cId="255726157" sldId="272"/>
-            <ac:spMk id="4" creationId="{E32E5483-4E85-4B6C-82D4-829F2DBF9DE9}"/>
-          </ac:spMkLst>
-        </pc:spChg>
-        <pc:spChg chg="add del">
-          <ac:chgData name="Jakob Erzar" userId="18a895aab62a8440" providerId="LiveId" clId="{9229E343-FD06-43D4-B292-7433C8E7B9CE}" dt="2018-01-10T12:21:10.580" v="984"/>
-          <ac:spMkLst>
-            <pc:docMk/>
-            <pc:sldMk cId="255726157" sldId="272"/>
-            <ac:spMk id="5" creationId="{F8B22143-C690-4143-88E1-D9D9E6133C0D}"/>
-          </ac:spMkLst>
-        </pc:spChg>
-        <pc:spChg chg="add del">
-          <ac:chgData name="Jakob Erzar" userId="18a895aab62a8440" providerId="LiveId" clId="{9229E343-FD06-43D4-B292-7433C8E7B9CE}" dt="2018-01-10T12:21:13.658" v="986"/>
-          <ac:spMkLst>
-            <pc:docMk/>
-            <pc:sldMk cId="255726157" sldId="272"/>
-            <ac:spMk id="6" creationId="{F4EAB419-D554-4A36-8883-7A79D93180BF}"/>
-          </ac:spMkLst>
-        </pc:spChg>
-      </pc:sldChg>
-      <pc:sldChg chg="addSp delSp modSp add">
-        <pc:chgData name="Jakob Erzar" userId="18a895aab62a8440" providerId="LiveId" clId="{9229E343-FD06-43D4-B292-7433C8E7B9CE}" dt="2018-01-10T12:25:18.472" v="1244" actId="20577"/>
-        <pc:sldMkLst>
-          <pc:docMk/>
-          <pc:sldMk cId="2952572422" sldId="273"/>
-        </pc:sldMkLst>
-        <pc:spChg chg="mod">
-          <ac:chgData name="Jakob Erzar" userId="18a895aab62a8440" providerId="LiveId" clId="{9229E343-FD06-43D4-B292-7433C8E7B9CE}" dt="2018-01-10T12:23:59.016" v="1134" actId="20577"/>
-          <ac:spMkLst>
-            <pc:docMk/>
-            <pc:sldMk cId="2952572422" sldId="273"/>
-            <ac:spMk id="2" creationId="{8EB95D22-8F0C-42AA-9238-C5D85D366720}"/>
-          </ac:spMkLst>
-        </pc:spChg>
-        <pc:spChg chg="mod">
-          <ac:chgData name="Jakob Erzar" userId="18a895aab62a8440" providerId="LiveId" clId="{9229E343-FD06-43D4-B292-7433C8E7B9CE}" dt="2018-01-10T12:25:18.472" v="1244" actId="20577"/>
-          <ac:spMkLst>
-            <pc:docMk/>
-            <pc:sldMk cId="2952572422" sldId="273"/>
-            <ac:spMk id="3" creationId="{DFA2FC86-E467-4CDA-9BA9-E21D8169F6C9}"/>
-          </ac:spMkLst>
-        </pc:spChg>
-        <pc:spChg chg="add del">
-          <ac:chgData name="Jakob Erzar" userId="18a895aab62a8440" providerId="LiveId" clId="{9229E343-FD06-43D4-B292-7433C8E7B9CE}" dt="2018-01-10T12:24:36.612" v="1196"/>
-          <ac:spMkLst>
-            <pc:docMk/>
-            <pc:sldMk cId="2952572422" sldId="273"/>
-            <ac:spMk id="4" creationId="{5B8B7CF7-EECF-4F1F-901B-161A0BDC67EF}"/>
-          </ac:spMkLst>
-        </pc:spChg>
-      </pc:sldChg>
-      <pc:sldChg chg="modSp add">
-        <pc:chgData name="Jakob Erzar" userId="18a895aab62a8440" providerId="LiveId" clId="{9229E343-FD06-43D4-B292-7433C8E7B9CE}" dt="2018-01-10T12:27:09.836" v="1284"/>
-        <pc:sldMkLst>
-          <pc:docMk/>
-          <pc:sldMk cId="2501041114" sldId="274"/>
-        </pc:sldMkLst>
-        <pc:spChg chg="mod">
-          <ac:chgData name="Jakob Erzar" userId="18a895aab62a8440" providerId="LiveId" clId="{9229E343-FD06-43D4-B292-7433C8E7B9CE}" dt="2018-01-10T12:27:01.767" v="1274" actId="20577"/>
-          <ac:spMkLst>
-            <pc:docMk/>
-            <pc:sldMk cId="2501041114" sldId="274"/>
-            <ac:spMk id="2" creationId="{09CF07B1-EC3A-4938-9444-14990463B2D1}"/>
-          </ac:spMkLst>
-        </pc:spChg>
-        <pc:spChg chg="mod">
-          <ac:chgData name="Jakob Erzar" userId="18a895aab62a8440" providerId="LiveId" clId="{9229E343-FD06-43D4-B292-7433C8E7B9CE}" dt="2018-01-10T12:27:09.836" v="1284"/>
-          <ac:spMkLst>
-            <pc:docMk/>
-            <pc:sldMk cId="2501041114" sldId="274"/>
-            <ac:spMk id="3" creationId="{6DE55313-8551-41DF-99E6-8E021B235CD0}"/>
-          </ac:spMkLst>
-        </pc:spChg>
-      </pc:sldChg>
-      <pc:sldChg chg="modSp add">
-        <pc:chgData name="Jakob Erzar" userId="18a895aab62a8440" providerId="LiveId" clId="{9229E343-FD06-43D4-B292-7433C8E7B9CE}" dt="2018-01-10T12:30:59.984" v="1434" actId="20577"/>
-        <pc:sldMkLst>
-          <pc:docMk/>
-          <pc:sldMk cId="2965761863" sldId="275"/>
-        </pc:sldMkLst>
-        <pc:spChg chg="mod">
-          <ac:chgData name="Jakob Erzar" userId="18a895aab62a8440" providerId="LiveId" clId="{9229E343-FD06-43D4-B292-7433C8E7B9CE}" dt="2018-01-10T12:27:53.569" v="1317" actId="20577"/>
-          <ac:spMkLst>
-            <pc:docMk/>
-            <pc:sldMk cId="2965761863" sldId="275"/>
-            <ac:spMk id="2" creationId="{09CB5090-2610-43A4-A4F4-7C7AFBB46BC1}"/>
-          </ac:spMkLst>
-        </pc:spChg>
-        <pc:spChg chg="mod">
-          <ac:chgData name="Jakob Erzar" userId="18a895aab62a8440" providerId="LiveId" clId="{9229E343-FD06-43D4-B292-7433C8E7B9CE}" dt="2018-01-10T12:30:59.984" v="1434" actId="20577"/>
-          <ac:spMkLst>
-            <pc:docMk/>
-            <pc:sldMk cId="2965761863" sldId="275"/>
-            <ac:spMk id="3" creationId="{92C21904-1188-4012-B0C4-2564BB00653C}"/>
-          </ac:spMkLst>
-        </pc:spChg>
-      </pc:sldChg>
-      <pc:sldChg chg="modSp add">
-        <pc:chgData name="Jakob Erzar" userId="18a895aab62a8440" providerId="LiveId" clId="{9229E343-FD06-43D4-B292-7433C8E7B9CE}" dt="2018-01-10T12:32:27.381" v="1544" actId="20577"/>
-        <pc:sldMkLst>
-          <pc:docMk/>
-          <pc:sldMk cId="2175856007" sldId="276"/>
-        </pc:sldMkLst>
-        <pc:spChg chg="mod">
-          <ac:chgData name="Jakob Erzar" userId="18a895aab62a8440" providerId="LiveId" clId="{9229E343-FD06-43D4-B292-7433C8E7B9CE}" dt="2018-01-10T12:31:19.499" v="1448" actId="20577"/>
-          <ac:spMkLst>
-            <pc:docMk/>
-            <pc:sldMk cId="2175856007" sldId="276"/>
-            <ac:spMk id="2" creationId="{69AF6DA7-C27C-4D9E-B1EC-858AD0D094A9}"/>
-          </ac:spMkLst>
-        </pc:spChg>
-        <pc:spChg chg="mod">
-          <ac:chgData name="Jakob Erzar" userId="18a895aab62a8440" providerId="LiveId" clId="{9229E343-FD06-43D4-B292-7433C8E7B9CE}" dt="2018-01-10T12:32:27.381" v="1544" actId="20577"/>
-          <ac:spMkLst>
-            <pc:docMk/>
-            <pc:sldMk cId="2175856007" sldId="276"/>
-            <ac:spMk id="3" creationId="{2EA55E6F-2B7A-4184-BA9C-66B716EE9925}"/>
-          </ac:spMkLst>
-        </pc:spChg>
-      </pc:sldChg>
-      <pc:sldChg chg="modSp add">
-        <pc:chgData name="Jakob Erzar" userId="18a895aab62a8440" providerId="LiveId" clId="{9229E343-FD06-43D4-B292-7433C8E7B9CE}" dt="2018-01-10T12:35:25.961" v="2043" actId="20577"/>
-        <pc:sldMkLst>
-          <pc:docMk/>
-          <pc:sldMk cId="3418445149" sldId="277"/>
-        </pc:sldMkLst>
-        <pc:spChg chg="mod">
-          <ac:chgData name="Jakob Erzar" userId="18a895aab62a8440" providerId="LiveId" clId="{9229E343-FD06-43D4-B292-7433C8E7B9CE}" dt="2018-01-10T12:32:46.379" v="1574" actId="20577"/>
-          <ac:spMkLst>
-            <pc:docMk/>
-            <pc:sldMk cId="3418445149" sldId="277"/>
-            <ac:spMk id="2" creationId="{84C58061-4021-44DC-82D8-61666F345518}"/>
-          </ac:spMkLst>
-        </pc:spChg>
-        <pc:spChg chg="mod">
-          <ac:chgData name="Jakob Erzar" userId="18a895aab62a8440" providerId="LiveId" clId="{9229E343-FD06-43D4-B292-7433C8E7B9CE}" dt="2018-01-10T12:35:25.961" v="2043" actId="20577"/>
-          <ac:spMkLst>
-            <pc:docMk/>
-            <pc:sldMk cId="3418445149" sldId="277"/>
-            <ac:spMk id="3" creationId="{26E0191E-2727-446A-B94D-63C86B244C79}"/>
-          </ac:spMkLst>
-        </pc:spChg>
-      </pc:sldChg>
-      <pc:sldChg chg="modSp add">
-        <pc:chgData name="Jakob Erzar" userId="18a895aab62a8440" providerId="LiveId" clId="{9229E343-FD06-43D4-B292-7433C8E7B9CE}" dt="2018-01-10T12:33:55.425" v="1797" actId="20577"/>
-        <pc:sldMkLst>
-          <pc:docMk/>
-          <pc:sldMk cId="1993042287" sldId="278"/>
-        </pc:sldMkLst>
-        <pc:spChg chg="mod">
-          <ac:chgData name="Jakob Erzar" userId="18a895aab62a8440" providerId="LiveId" clId="{9229E343-FD06-43D4-B292-7433C8E7B9CE}" dt="2018-01-10T12:32:59.102" v="1595" actId="20577"/>
-          <ac:spMkLst>
-            <pc:docMk/>
-            <pc:sldMk cId="1993042287" sldId="278"/>
-            <ac:spMk id="2" creationId="{A7512541-AB65-4737-9B7F-842B7E8DDC58}"/>
-          </ac:spMkLst>
-        </pc:spChg>
-        <pc:spChg chg="mod">
-          <ac:chgData name="Jakob Erzar" userId="18a895aab62a8440" providerId="LiveId" clId="{9229E343-FD06-43D4-B292-7433C8E7B9CE}" dt="2018-01-10T12:33:55.425" v="1797" actId="20577"/>
-          <ac:spMkLst>
-            <pc:docMk/>
-            <pc:sldMk cId="1993042287" sldId="278"/>
-            <ac:spMk id="3" creationId="{24D2BB39-9EB3-47BD-AB6D-80BBC765C22D}"/>
-          </ac:spMkLst>
-        </pc:spChg>
-      </pc:sldChg>
-      <pc:sldChg chg="modSp add">
-        <pc:chgData name="Jakob Erzar" userId="18a895aab62a8440" providerId="LiveId" clId="{9229E343-FD06-43D4-B292-7433C8E7B9CE}" dt="2018-01-10T12:36:13.737" v="2185" actId="20577"/>
-        <pc:sldMkLst>
-          <pc:docMk/>
-          <pc:sldMk cId="2777948457" sldId="279"/>
-        </pc:sldMkLst>
-        <pc:spChg chg="mod">
-          <ac:chgData name="Jakob Erzar" userId="18a895aab62a8440" providerId="LiveId" clId="{9229E343-FD06-43D4-B292-7433C8E7B9CE}" dt="2018-01-10T12:35:39.793" v="2055" actId="20577"/>
-          <ac:spMkLst>
-            <pc:docMk/>
-            <pc:sldMk cId="2777948457" sldId="279"/>
-            <ac:spMk id="2" creationId="{E21CBE2B-6CE2-4054-9B2E-AA715440C554}"/>
-          </ac:spMkLst>
-        </pc:spChg>
-        <pc:spChg chg="mod">
-          <ac:chgData name="Jakob Erzar" userId="18a895aab62a8440" providerId="LiveId" clId="{9229E343-FD06-43D4-B292-7433C8E7B9CE}" dt="2018-01-10T12:36:13.737" v="2185" actId="20577"/>
-          <ac:spMkLst>
-            <pc:docMk/>
-            <pc:sldMk cId="2777948457" sldId="279"/>
-            <ac:spMk id="3" creationId="{54C3A4A8-0F0F-4C35-B8BD-0F8F774CF051}"/>
-          </ac:spMkLst>
-        </pc:spChg>
-      </pc:sldChg>
-      <pc:sldChg chg="modSp add">
-        <pc:chgData name="Jakob Erzar" userId="18a895aab62a8440" providerId="LiveId" clId="{9229E343-FD06-43D4-B292-7433C8E7B9CE}" dt="2018-01-10T12:37:20.469" v="2415" actId="20577"/>
+        <pc:chgData name="Jakob Erzar" userId="18a895aab62a8440" providerId="LiveId" clId="{E07EA255-8232-44D9-B308-6D05CC31048C}" dt="2018-07-18T02:35:29.166" v="5" actId="20577"/>
         <pc:sldMkLst>
           <pc:docMk/>
           <pc:sldMk cId="3354056300" sldId="280"/>
         </pc:sldMkLst>
         <pc:spChg chg="mod">
-          <ac:chgData name="Jakob Erzar" userId="18a895aab62a8440" providerId="LiveId" clId="{9229E343-FD06-43D4-B292-7433C8E7B9CE}" dt="2018-01-10T12:36:29.596" v="2201" actId="20577"/>
-          <ac:spMkLst>
-            <pc:docMk/>
-            <pc:sldMk cId="3354056300" sldId="280"/>
-            <ac:spMk id="2" creationId="{D9D1E52F-D430-46AB-BC14-AA30F0E90542}"/>
-          </ac:spMkLst>
-        </pc:spChg>
-        <pc:spChg chg="mod">
-          <ac:chgData name="Jakob Erzar" userId="18a895aab62a8440" providerId="LiveId" clId="{9229E343-FD06-43D4-B292-7433C8E7B9CE}" dt="2018-01-10T12:37:20.469" v="2415" actId="20577"/>
+          <ac:chgData name="Jakob Erzar" userId="18a895aab62a8440" providerId="LiveId" clId="{E07EA255-8232-44D9-B308-6D05CC31048C}" dt="2018-07-18T02:35:29.166" v="5" actId="20577"/>
           <ac:spMkLst>
             <pc:docMk/>
             <pc:sldMk cId="3354056300" sldId="280"/>
             <ac:spMk id="3" creationId="{D1A30E5A-ADEB-41D7-9F0A-EA556FBEB2BD}"/>
-          </ac:spMkLst>
-        </pc:spChg>
-      </pc:sldChg>
-      <pc:sldChg chg="modSp add">
-        <pc:chgData name="Jakob Erzar" userId="18a895aab62a8440" providerId="LiveId" clId="{9229E343-FD06-43D4-B292-7433C8E7B9CE}" dt="2018-01-10T12:39:51.879" v="3005" actId="5793"/>
-        <pc:sldMkLst>
-          <pc:docMk/>
-          <pc:sldMk cId="2016166150" sldId="281"/>
-        </pc:sldMkLst>
-        <pc:spChg chg="mod">
-          <ac:chgData name="Jakob Erzar" userId="18a895aab62a8440" providerId="LiveId" clId="{9229E343-FD06-43D4-B292-7433C8E7B9CE}" dt="2018-01-10T12:37:33.148" v="2440" actId="20577"/>
-          <ac:spMkLst>
-            <pc:docMk/>
-            <pc:sldMk cId="2016166150" sldId="281"/>
-            <ac:spMk id="2" creationId="{4604CD6F-B8B0-4D9C-9A4C-3F306942C26E}"/>
-          </ac:spMkLst>
-        </pc:spChg>
-        <pc:spChg chg="mod">
-          <ac:chgData name="Jakob Erzar" userId="18a895aab62a8440" providerId="LiveId" clId="{9229E343-FD06-43D4-B292-7433C8E7B9CE}" dt="2018-01-10T12:39:51.879" v="3005" actId="5793"/>
-          <ac:spMkLst>
-            <pc:docMk/>
-            <pc:sldMk cId="2016166150" sldId="281"/>
-            <ac:spMk id="3" creationId="{B06DF79B-8C01-4B9B-B713-68C65B2D4B5E}"/>
-          </ac:spMkLst>
-        </pc:spChg>
-      </pc:sldChg>
-      <pc:sldChg chg="modSp add">
-        <pc:chgData name="Jakob Erzar" userId="18a895aab62a8440" providerId="LiveId" clId="{9229E343-FD06-43D4-B292-7433C8E7B9CE}" dt="2018-01-10T12:41:02.698" v="3241" actId="5793"/>
-        <pc:sldMkLst>
-          <pc:docMk/>
-          <pc:sldMk cId="272533302" sldId="282"/>
-        </pc:sldMkLst>
-        <pc:spChg chg="mod">
-          <ac:chgData name="Jakob Erzar" userId="18a895aab62a8440" providerId="LiveId" clId="{9229E343-FD06-43D4-B292-7433C8E7B9CE}" dt="2018-01-10T12:40:05.946" v="3036" actId="20577"/>
-          <ac:spMkLst>
-            <pc:docMk/>
-            <pc:sldMk cId="272533302" sldId="282"/>
-            <ac:spMk id="2" creationId="{FEAD3118-7FD1-4B91-88EA-4C8DBA037A32}"/>
-          </ac:spMkLst>
-        </pc:spChg>
-        <pc:spChg chg="mod">
-          <ac:chgData name="Jakob Erzar" userId="18a895aab62a8440" providerId="LiveId" clId="{9229E343-FD06-43D4-B292-7433C8E7B9CE}" dt="2018-01-10T12:41:02.698" v="3241" actId="5793"/>
-          <ac:spMkLst>
-            <pc:docMk/>
-            <pc:sldMk cId="272533302" sldId="282"/>
-            <ac:spMk id="3" creationId="{02EF352C-5DA8-4F94-B027-0DDE82C5DCE3}"/>
-          </ac:spMkLst>
-        </pc:spChg>
-      </pc:sldChg>
-      <pc:sldChg chg="modSp add">
-        <pc:chgData name="Jakob Erzar" userId="18a895aab62a8440" providerId="LiveId" clId="{9229E343-FD06-43D4-B292-7433C8E7B9CE}" dt="2018-01-10T12:44:29.771" v="3423" actId="20577"/>
-        <pc:sldMkLst>
-          <pc:docMk/>
-          <pc:sldMk cId="402534928" sldId="283"/>
-        </pc:sldMkLst>
-        <pc:spChg chg="mod">
-          <ac:chgData name="Jakob Erzar" userId="18a895aab62a8440" providerId="LiveId" clId="{9229E343-FD06-43D4-B292-7433C8E7B9CE}" dt="2018-01-10T12:41:22.971" v="3247" actId="20577"/>
-          <ac:spMkLst>
-            <pc:docMk/>
-            <pc:sldMk cId="402534928" sldId="283"/>
-            <ac:spMk id="2" creationId="{A28E0AB1-ACCB-49E7-B41E-BB3E9D1B8D06}"/>
-          </ac:spMkLst>
-        </pc:spChg>
-        <pc:spChg chg="mod">
-          <ac:chgData name="Jakob Erzar" userId="18a895aab62a8440" providerId="LiveId" clId="{9229E343-FD06-43D4-B292-7433C8E7B9CE}" dt="2018-01-10T12:44:29.771" v="3423" actId="20577"/>
-          <ac:spMkLst>
-            <pc:docMk/>
-            <pc:sldMk cId="402534928" sldId="283"/>
-            <ac:spMk id="3" creationId="{B71C410E-54C1-4756-A80E-27D7E119BA72}"/>
-          </ac:spMkLst>
-        </pc:spChg>
-      </pc:sldChg>
-      <pc:sldChg chg="addSp modSp add">
-        <pc:chgData name="Jakob Erzar" userId="18a895aab62a8440" providerId="LiveId" clId="{9229E343-FD06-43D4-B292-7433C8E7B9CE}" dt="2018-01-10T12:54:47.700" v="3674" actId="20577"/>
-        <pc:sldMkLst>
-          <pc:docMk/>
-          <pc:sldMk cId="2628571616" sldId="284"/>
-        </pc:sldMkLst>
-        <pc:spChg chg="mod">
-          <ac:chgData name="Jakob Erzar" userId="18a895aab62a8440" providerId="LiveId" clId="{9229E343-FD06-43D4-B292-7433C8E7B9CE}" dt="2018-01-10T12:47:12.835" v="3540" actId="20577"/>
-          <ac:spMkLst>
-            <pc:docMk/>
-            <pc:sldMk cId="2628571616" sldId="284"/>
-            <ac:spMk id="2" creationId="{A4BD43B9-34BB-4912-9B19-F392D4CFE32C}"/>
-          </ac:spMkLst>
-        </pc:spChg>
-        <pc:spChg chg="mod">
-          <ac:chgData name="Jakob Erzar" userId="18a895aab62a8440" providerId="LiveId" clId="{9229E343-FD06-43D4-B292-7433C8E7B9CE}" dt="2018-01-10T12:54:47.700" v="3674" actId="20577"/>
-          <ac:spMkLst>
-            <pc:docMk/>
-            <pc:sldMk cId="2628571616" sldId="284"/>
-            <ac:spMk id="3" creationId="{FB516BAC-C2F1-441F-804F-FAEFDF5D291A}"/>
-          </ac:spMkLst>
-        </pc:spChg>
-        <pc:picChg chg="add mod">
-          <ac:chgData name="Jakob Erzar" userId="18a895aab62a8440" providerId="LiveId" clId="{9229E343-FD06-43D4-B292-7433C8E7B9CE}" dt="2018-01-10T12:46:37.425" v="3437" actId="14100"/>
-          <ac:picMkLst>
-            <pc:docMk/>
-            <pc:sldMk cId="2628571616" sldId="284"/>
-            <ac:picMk id="4" creationId="{DCE4F417-0B5A-4271-913F-DF0D25B8D27B}"/>
-          </ac:picMkLst>
-        </pc:picChg>
-        <pc:picChg chg="add mod">
-          <ac:chgData name="Jakob Erzar" userId="18a895aab62a8440" providerId="LiveId" clId="{9229E343-FD06-43D4-B292-7433C8E7B9CE}" dt="2018-01-10T12:47:33.777" v="3545" actId="1076"/>
-          <ac:picMkLst>
-            <pc:docMk/>
-            <pc:sldMk cId="2628571616" sldId="284"/>
-            <ac:picMk id="5" creationId="{6271BD56-050C-4220-9094-9F5CE79AE51E}"/>
-          </ac:picMkLst>
-        </pc:picChg>
-      </pc:sldChg>
-      <pc:sldChg chg="modSp add">
-        <pc:chgData name="Jakob Erzar" userId="18a895aab62a8440" providerId="LiveId" clId="{9229E343-FD06-43D4-B292-7433C8E7B9CE}" dt="2018-01-10T12:58:51.013" v="3727" actId="27636"/>
-        <pc:sldMkLst>
-          <pc:docMk/>
-          <pc:sldMk cId="862404442" sldId="285"/>
-        </pc:sldMkLst>
-        <pc:spChg chg="mod">
-          <ac:chgData name="Jakob Erzar" userId="18a895aab62a8440" providerId="LiveId" clId="{9229E343-FD06-43D4-B292-7433C8E7B9CE}" dt="2018-01-10T12:58:41.190" v="3722" actId="20577"/>
-          <ac:spMkLst>
-            <pc:docMk/>
-            <pc:sldMk cId="862404442" sldId="285"/>
-            <ac:spMk id="2" creationId="{80AEE0DF-9E8E-424A-8C70-D2E0F87960A6}"/>
-          </ac:spMkLst>
-        </pc:spChg>
-        <pc:spChg chg="mod">
-          <ac:chgData name="Jakob Erzar" userId="18a895aab62a8440" providerId="LiveId" clId="{9229E343-FD06-43D4-B292-7433C8E7B9CE}" dt="2018-01-10T12:58:51.013" v="3727" actId="27636"/>
-          <ac:spMkLst>
-            <pc:docMk/>
-            <pc:sldMk cId="862404442" sldId="285"/>
-            <ac:spMk id="3" creationId="{990F9D16-4614-4497-95DE-3E57EC427EF4}"/>
-          </ac:spMkLst>
-        </pc:spChg>
-      </pc:sldChg>
-      <pc:sldChg chg="modSp add ord">
-        <pc:chgData name="Jakob Erzar" userId="18a895aab62a8440" providerId="LiveId" clId="{9229E343-FD06-43D4-B292-7433C8E7B9CE}" dt="2018-01-10T13:01:11.188" v="3902" actId="20577"/>
-        <pc:sldMkLst>
-          <pc:docMk/>
-          <pc:sldMk cId="275155150" sldId="286"/>
-        </pc:sldMkLst>
-        <pc:spChg chg="mod">
-          <ac:chgData name="Jakob Erzar" userId="18a895aab62a8440" providerId="LiveId" clId="{9229E343-FD06-43D4-B292-7433C8E7B9CE}" dt="2018-01-10T13:00:19.469" v="3756" actId="20577"/>
-          <ac:spMkLst>
-            <pc:docMk/>
-            <pc:sldMk cId="275155150" sldId="286"/>
-            <ac:spMk id="2" creationId="{DAC72898-5260-4E51-A2DC-594B84F1FABC}"/>
-          </ac:spMkLst>
-        </pc:spChg>
-        <pc:spChg chg="mod">
-          <ac:chgData name="Jakob Erzar" userId="18a895aab62a8440" providerId="LiveId" clId="{9229E343-FD06-43D4-B292-7433C8E7B9CE}" dt="2018-01-10T13:01:11.188" v="3902" actId="20577"/>
-          <ac:spMkLst>
-            <pc:docMk/>
-            <pc:sldMk cId="275155150" sldId="286"/>
-            <ac:spMk id="3" creationId="{72C082A4-2381-419B-827A-E0263BEEEDD4}"/>
           </ac:spMkLst>
         </pc:spChg>
       </pc:sldChg>
@@ -1034,7 +310,7 @@
           <a:p>
             <a:fld id="{49159BA0-0305-4706-9458-C4E5E90B6282}" type="datetimeFigureOut">
               <a:rPr lang="sl-SI" smtClean="0"/>
-              <a:t>10. 01. 2018</a:t>
+              <a:t>18. 07. 2018</a:t>
             </a:fld>
             <a:endParaRPr lang="sl-SI"/>
           </a:p>
@@ -1560,7 +836,7 @@
           <a:p>
             <a:fld id="{1160EA64-D806-43AC-9DF2-F8C432F32B4C}" type="datetimeFigureOut">
               <a:rPr lang="en-US" dirty="0"/>
-              <a:t>1/10/2018</a:t>
+              <a:t>7/18/2018</a:t>
             </a:fld>
             <a:endParaRPr lang="en-US" dirty="0"/>
           </a:p>
@@ -1726,7 +1002,7 @@
           <a:p>
             <a:fld id="{E9F9C37B-1D36-470B-8223-D6C91242EC14}" type="datetimeFigureOut">
               <a:rPr lang="en-US" dirty="0"/>
-              <a:t>1/10/2018</a:t>
+              <a:t>7/18/2018</a:t>
             </a:fld>
             <a:endParaRPr lang="en-US" dirty="0"/>
           </a:p>
@@ -1901,7 +1177,7 @@
           <a:p>
             <a:fld id="{67C6F52A-A82B-47A2-A83A-8C4C91F2D59F}" type="datetimeFigureOut">
               <a:rPr lang="en-US" dirty="0"/>
-              <a:t>1/10/2018</a:t>
+              <a:t>7/18/2018</a:t>
             </a:fld>
             <a:endParaRPr lang="en-US" dirty="0"/>
           </a:p>
@@ -2066,7 +1342,7 @@
           <a:p>
             <a:fld id="{F070A7B3-6521-4DCA-87E5-044747A908C1}" type="datetimeFigureOut">
               <a:rPr lang="en-US" dirty="0"/>
-              <a:t>1/10/2018</a:t>
+              <a:t>7/18/2018</a:t>
             </a:fld>
             <a:endParaRPr lang="en-US" dirty="0"/>
           </a:p>
@@ -2330,7 +1606,7 @@
           <a:p>
             <a:fld id="{1160EA64-D806-43AC-9DF2-F8C432F32B4C}" type="datetimeFigureOut">
               <a:rPr lang="en-US" dirty="0"/>
-              <a:t>1/10/2018</a:t>
+              <a:t>7/18/2018</a:t>
             </a:fld>
             <a:endParaRPr lang="en-US" dirty="0"/>
           </a:p>
@@ -2558,7 +1834,7 @@
           <a:p>
             <a:fld id="{AB134690-1557-4C89-A502-4959FE7FAD70}" type="datetimeFigureOut">
               <a:rPr lang="en-US" dirty="0"/>
-              <a:t>1/10/2018</a:t>
+              <a:t>7/18/2018</a:t>
             </a:fld>
             <a:endParaRPr lang="en-US" dirty="0"/>
           </a:p>
@@ -2912,7 +2188,7 @@
           <a:p>
             <a:fld id="{4F7D4976-E339-4826-83B7-FBD03F55ECF8}" type="datetimeFigureOut">
               <a:rPr lang="en-US" dirty="0"/>
-              <a:t>1/10/2018</a:t>
+              <a:t>7/18/2018</a:t>
             </a:fld>
             <a:endParaRPr lang="en-US" dirty="0"/>
           </a:p>
@@ -3048,7 +2324,7 @@
           <a:p>
             <a:fld id="{E1037C31-9E7A-4F99-8774-A0E530DE1A42}" type="datetimeFigureOut">
               <a:rPr lang="en-US" dirty="0"/>
-              <a:t>1/10/2018</a:t>
+              <a:t>7/18/2018</a:t>
             </a:fld>
             <a:endParaRPr lang="en-US" dirty="0"/>
           </a:p>
@@ -3138,7 +2414,7 @@
           <a:p>
             <a:fld id="{C278504F-A551-4DE0-9316-4DCD1D8CC752}" type="datetimeFigureOut">
               <a:rPr lang="en-US" dirty="0"/>
-              <a:t>1/10/2018</a:t>
+              <a:t>7/18/2018</a:t>
             </a:fld>
             <a:endParaRPr lang="en-US" dirty="0"/>
           </a:p>
@@ -3490,7 +2766,7 @@
           <a:p>
             <a:fld id="{D1BE4249-C0D0-4B06-8692-E8BB871AF643}" type="datetimeFigureOut">
               <a:rPr lang="en-US" dirty="0"/>
-              <a:t>1/10/2018</a:t>
+              <a:t>7/18/2018</a:t>
             </a:fld>
             <a:endParaRPr lang="en-US" dirty="0"/>
           </a:p>
@@ -3842,7 +3118,7 @@
           <a:p>
             <a:fld id="{042B0DB6-F5C7-45FB-8CF3-31B45F9C2DAC}" type="datetimeFigureOut">
               <a:rPr lang="en-US" dirty="0"/>
-              <a:t>1/10/2018</a:t>
+              <a:t>7/18/2018</a:t>
             </a:fld>
             <a:endParaRPr lang="en-US" dirty="0"/>
           </a:p>
@@ -4078,7 +3354,7 @@
           <a:p>
             <a:fld id="{1160EA64-D806-43AC-9DF2-F8C432F32B4C}" type="datetimeFigureOut">
               <a:rPr lang="en-US" dirty="0"/>
-              <a:t>1/10/2018</a:t>
+              <a:t>7/18/2018</a:t>
             </a:fld>
             <a:endParaRPr lang="en-US" dirty="0"/>
           </a:p>
@@ -5064,7 +4340,12 @@
             <p:ph idx="1"/>
           </p:nvPr>
         </p:nvSpPr>
-        <p:spPr/>
+        <p:spPr>
+          <a:xfrm>
+            <a:off x="2231136" y="2638044"/>
+            <a:ext cx="7913528" cy="3618982"/>
+          </a:xfrm>
+        </p:spPr>
         <p:txBody>
           <a:bodyPr>
             <a:normAutofit/>
@@ -5237,6 +4518,22 @@
             </a:r>
           </a:p>
           <a:p>
+            <a:r>
+              <a:rPr lang="sl-SI" dirty="0"/>
+              <a:t>Primer v </a:t>
+            </a:r>
+            <a:r>
+              <a:rPr lang="sl-SI" dirty="0" err="1"/>
+              <a:t>examples</a:t>
+            </a:r>
+            <a:r>
+              <a:rPr lang="sl-SI" dirty="0"/>
+              <a:t>/</a:t>
+            </a:r>
+            <a:r>
+              <a:rPr lang="sl-SI" dirty="0" err="1"/>
+              <a:t>ptrace_traceme_example.c</a:t>
+            </a:r>
             <a:endParaRPr lang="sl-SI" dirty="0"/>
           </a:p>
           <a:p>
@@ -5258,105 +4555,6 @@
 </file>
 
 <file path=ppt/slides/slide14.xml><?xml version="1.0" encoding="utf-8"?>
-<p:sld xmlns:a="http://schemas.openxmlformats.org/drawingml/2006/main" xmlns:r="http://schemas.openxmlformats.org/officeDocument/2006/relationships" xmlns:p="http://schemas.openxmlformats.org/presentationml/2006/main">
-  <p:cSld>
-    <p:spTree>
-      <p:nvGrpSpPr>
-        <p:cNvPr id="1" name=""/>
-        <p:cNvGrpSpPr/>
-        <p:nvPr/>
-      </p:nvGrpSpPr>
-      <p:grpSpPr>
-        <a:xfrm>
-          <a:off x="0" y="0"/>
-          <a:ext cx="0" cy="0"/>
-          <a:chOff x="0" y="0"/>
-          <a:chExt cx="0" cy="0"/>
-        </a:xfrm>
-      </p:grpSpPr>
-      <p:sp>
-        <p:nvSpPr>
-          <p:cNvPr id="2" name="Title 1">
-            <a:extLst>
-              <a:ext uri="{FF2B5EF4-FFF2-40B4-BE49-F238E27FC236}">
-                <a16:creationId xmlns:a16="http://schemas.microsoft.com/office/drawing/2014/main" id="{6576E4F7-645C-4D9D-870A-4188060FFF8F}"/>
-              </a:ext>
-            </a:extLst>
-          </p:cNvPr>
-          <p:cNvSpPr>
-            <a:spLocks noGrp="1"/>
-          </p:cNvSpPr>
-          <p:nvPr>
-            <p:ph type="title"/>
-          </p:nvPr>
-        </p:nvSpPr>
-        <p:spPr/>
-        <p:txBody>
-          <a:bodyPr/>
-          <a:lstStyle/>
-          <a:p>
-            <a:r>
-              <a:rPr lang="sl-SI" dirty="0"/>
-              <a:t>PTRACE - PRIMER</a:t>
-            </a:r>
-          </a:p>
-        </p:txBody>
-      </p:sp>
-      <p:sp>
-        <p:nvSpPr>
-          <p:cNvPr id="3" name="Content Placeholder 2">
-            <a:extLst>
-              <a:ext uri="{FF2B5EF4-FFF2-40B4-BE49-F238E27FC236}">
-                <a16:creationId xmlns:a16="http://schemas.microsoft.com/office/drawing/2014/main" id="{28FB93D1-4BC9-4D10-9D96-70C17A1B21B3}"/>
-              </a:ext>
-            </a:extLst>
-          </p:cNvPr>
-          <p:cNvSpPr>
-            <a:spLocks noGrp="1"/>
-          </p:cNvSpPr>
-          <p:nvPr>
-            <p:ph idx="1"/>
-          </p:nvPr>
-        </p:nvSpPr>
-        <p:spPr/>
-        <p:txBody>
-          <a:bodyPr/>
-          <a:lstStyle/>
-          <a:p>
-            <a:r>
-              <a:rPr lang="sl-SI" dirty="0"/>
-              <a:t>v mapi </a:t>
-            </a:r>
-            <a:r>
-              <a:rPr lang="sl-SI" dirty="0" err="1"/>
-              <a:t>examples</a:t>
-            </a:r>
-            <a:r>
-              <a:rPr lang="sl-SI" dirty="0"/>
-              <a:t>/</a:t>
-            </a:r>
-            <a:r>
-              <a:rPr lang="sl-SI" dirty="0" err="1"/>
-              <a:t>ptrace_traceme_example</a:t>
-            </a:r>
-            <a:endParaRPr lang="sl-SI" dirty="0"/>
-          </a:p>
-        </p:txBody>
-      </p:sp>
-    </p:spTree>
-    <p:extLst>
-      <p:ext uri="{BB962C8B-B14F-4D97-AF65-F5344CB8AC3E}">
-        <p14:creationId xmlns:p14="http://schemas.microsoft.com/office/powerpoint/2010/main" val="3481417011"/>
-      </p:ext>
-    </p:extLst>
-  </p:cSld>
-  <p:clrMapOvr>
-    <a:masterClrMapping/>
-  </p:clrMapOvr>
-</p:sld>
-</file>
-
-<file path=ppt/slides/slide15.xml><?xml version="1.0" encoding="utf-8"?>
 <p:sld xmlns:a="http://schemas.openxmlformats.org/drawingml/2006/main" xmlns:r="http://schemas.openxmlformats.org/officeDocument/2006/relationships" xmlns:p="http://schemas.openxmlformats.org/presentationml/2006/main">
   <p:cSld>
     <p:spTree>
@@ -5808,6 +5006,153 @@
 </p:sld>
 </file>
 
+<file path=ppt/slides/slide15.xml><?xml version="1.0" encoding="utf-8"?>
+<p:sld xmlns:a="http://schemas.openxmlformats.org/drawingml/2006/main" xmlns:r="http://schemas.openxmlformats.org/officeDocument/2006/relationships" xmlns:p="http://schemas.openxmlformats.org/presentationml/2006/main">
+  <p:cSld>
+    <p:spTree>
+      <p:nvGrpSpPr>
+        <p:cNvPr id="1" name=""/>
+        <p:cNvGrpSpPr/>
+        <p:nvPr/>
+      </p:nvGrpSpPr>
+      <p:grpSpPr>
+        <a:xfrm>
+          <a:off x="0" y="0"/>
+          <a:ext cx="0" cy="0"/>
+          <a:chOff x="0" y="0"/>
+          <a:chExt cx="0" cy="0"/>
+        </a:xfrm>
+      </p:grpSpPr>
+      <p:sp>
+        <p:nvSpPr>
+          <p:cNvPr id="2" name="Title 1">
+            <a:extLst>
+              <a:ext uri="{FF2B5EF4-FFF2-40B4-BE49-F238E27FC236}">
+                <a16:creationId xmlns:a16="http://schemas.microsoft.com/office/drawing/2014/main" id="{717BEDDE-460A-43C5-BDAB-532CBB87B35F}"/>
+              </a:ext>
+            </a:extLst>
+          </p:cNvPr>
+          <p:cNvSpPr>
+            <a:spLocks noGrp="1"/>
+          </p:cNvSpPr>
+          <p:nvPr>
+            <p:ph type="title"/>
+          </p:nvPr>
+        </p:nvSpPr>
+        <p:spPr/>
+        <p:txBody>
+          <a:bodyPr/>
+          <a:lstStyle/>
+          <a:p>
+            <a:r>
+              <a:rPr lang="sl-SI" dirty="0" err="1"/>
+              <a:t>BREaKPOINT</a:t>
+            </a:r>
+            <a:r>
+              <a:rPr lang="sl-SI" dirty="0"/>
+              <a:t> (</a:t>
+            </a:r>
+            <a:r>
+              <a:rPr lang="sl-SI" dirty="0" err="1"/>
+              <a:t>prekinitvEne</a:t>
+            </a:r>
+            <a:r>
+              <a:rPr lang="sl-SI" dirty="0"/>
+              <a:t> točke)</a:t>
+            </a:r>
+          </a:p>
+        </p:txBody>
+      </p:sp>
+      <p:sp>
+        <p:nvSpPr>
+          <p:cNvPr id="3" name="Content Placeholder 2">
+            <a:extLst>
+              <a:ext uri="{FF2B5EF4-FFF2-40B4-BE49-F238E27FC236}">
+                <a16:creationId xmlns:a16="http://schemas.microsoft.com/office/drawing/2014/main" id="{77BD6FF8-F1C0-4748-95A4-441AC155EC32}"/>
+              </a:ext>
+            </a:extLst>
+          </p:cNvPr>
+          <p:cNvSpPr>
+            <a:spLocks noGrp="1"/>
+          </p:cNvSpPr>
+          <p:nvPr>
+            <p:ph idx="1"/>
+          </p:nvPr>
+        </p:nvSpPr>
+        <p:spPr/>
+        <p:txBody>
+          <a:bodyPr>
+            <a:normAutofit/>
+          </a:bodyPr>
+          <a:lstStyle/>
+          <a:p>
+            <a:r>
+              <a:rPr lang="sl-SI" dirty="0"/>
+              <a:t>Izbrani ukaz si shrani v spomin, na to mesto pa zapiše:</a:t>
+            </a:r>
+          </a:p>
+          <a:p>
+            <a:pPr lvl="1"/>
+            <a:r>
+              <a:rPr lang="sl-SI" dirty="0"/>
+              <a:t>poseben ukaz (na x86 je to INT 3)</a:t>
+            </a:r>
+          </a:p>
+          <a:p>
+            <a:pPr lvl="1"/>
+            <a:r>
+              <a:rPr lang="sl-SI" dirty="0"/>
+              <a:t>nedefinirano kodo (npr. pri ARM v ta namen rezervirane posebne kode, ki so v dokumentaciji označene kot nedefinirane, da se lahko uporabljajo v ta namen)</a:t>
+            </a:r>
+          </a:p>
+          <a:p>
+            <a:endParaRPr lang="sl-SI" dirty="0"/>
+          </a:p>
+          <a:p>
+            <a:r>
+              <a:rPr lang="sl-SI" dirty="0"/>
+              <a:t>V </a:t>
+            </a:r>
+            <a:r>
+              <a:rPr lang="sl-SI" dirty="0" err="1"/>
+              <a:t>gdb</a:t>
+            </a:r>
+            <a:r>
+              <a:rPr lang="sl-SI" dirty="0"/>
+              <a:t> lahko prekinitveno točko nastavimo z ukazom (</a:t>
+            </a:r>
+            <a:r>
+              <a:rPr lang="sl-SI" dirty="0" err="1"/>
+              <a:t>gdb</a:t>
+            </a:r>
+            <a:r>
+              <a:rPr lang="sl-SI" dirty="0"/>
+              <a:t>) </a:t>
+            </a:r>
+            <a:r>
+              <a:rPr lang="sl-SI" dirty="0" err="1"/>
+              <a:t>br</a:t>
+            </a:r>
+            <a:r>
+              <a:rPr lang="sl-SI" dirty="0"/>
+              <a:t> *ADDRESS.</a:t>
+            </a:r>
+          </a:p>
+        </p:txBody>
+      </p:sp>
+    </p:spTree>
+    <p:extLst>
+      <p:ext uri="{BB962C8B-B14F-4D97-AF65-F5344CB8AC3E}">
+        <p14:creationId xmlns:p14="http://schemas.microsoft.com/office/powerpoint/2010/main" val="907681658"/>
+      </p:ext>
+    </p:extLst>
+  </p:cSld>
+  <p:clrMapOvr>
+    <a:masterClrMapping/>
+  </p:clrMapOvr>
+</p:sld>
+</file>
+
 <file path=ppt/slides/slide16.xml><?xml version="1.0" encoding="utf-8"?>
 <p:sld xmlns:a="http://schemas.openxmlformats.org/drawingml/2006/main" xmlns:r="http://schemas.openxmlformats.org/officeDocument/2006/relationships" xmlns:p="http://schemas.openxmlformats.org/presentationml/2006/main">
   <p:cSld>
@@ -5830,7 +5175,7 @@
           <p:cNvPr id="2" name="Title 1">
             <a:extLst>
               <a:ext uri="{FF2B5EF4-FFF2-40B4-BE49-F238E27FC236}">
-                <a16:creationId xmlns:a16="http://schemas.microsoft.com/office/drawing/2014/main" id="{717BEDDE-460A-43C5-BDAB-532CBB87B35F}"/>
+                <a16:creationId xmlns:a16="http://schemas.microsoft.com/office/drawing/2014/main" id="{A3450B84-8CB5-4E78-AFC4-4E515B387F07}"/>
               </a:ext>
             </a:extLst>
           </p:cNvPr>
@@ -5847,20 +5192,8 @@
           <a:lstStyle/>
           <a:p>
             <a:r>
-              <a:rPr lang="sl-SI" dirty="0" err="1"/>
-              <a:t>BREaKPOINT</a:t>
-            </a:r>
-            <a:r>
-              <a:rPr lang="sl-SI" dirty="0"/>
-              <a:t> (</a:t>
-            </a:r>
-            <a:r>
-              <a:rPr lang="sl-SI" dirty="0" err="1"/>
-              <a:t>prekinitvEne</a:t>
-            </a:r>
-            <a:r>
-              <a:rPr lang="sl-SI" dirty="0"/>
-              <a:t> točke)</a:t>
+              <a:rPr lang="sl-SI" dirty="0"/>
+              <a:t>PASTI</a:t>
             </a:r>
           </a:p>
         </p:txBody>
@@ -5870,7 +5203,7 @@
           <p:cNvPr id="3" name="Content Placeholder 2">
             <a:extLst>
               <a:ext uri="{FF2B5EF4-FFF2-40B4-BE49-F238E27FC236}">
-                <a16:creationId xmlns:a16="http://schemas.microsoft.com/office/drawing/2014/main" id="{77BD6FF8-F1C0-4748-95A4-441AC155EC32}"/>
+                <a16:creationId xmlns:a16="http://schemas.microsoft.com/office/drawing/2014/main" id="{E1AD1311-F5FD-4565-961E-FDE71F9CE5E9}"/>
               </a:ext>
             </a:extLst>
           </p:cNvPr>
@@ -5881,63 +5214,92 @@
             <p:ph idx="1"/>
           </p:nvPr>
         </p:nvSpPr>
-        <p:spPr/>
+        <p:spPr>
+          <a:xfrm>
+            <a:off x="2231136" y="2638044"/>
+            <a:ext cx="7729728" cy="3664990"/>
+          </a:xfrm>
+        </p:spPr>
         <p:txBody>
           <a:bodyPr>
-            <a:normAutofit/>
+            <a:normAutofit fontScale="92500" lnSpcReduction="10000"/>
           </a:bodyPr>
           <a:lstStyle/>
           <a:p>
             <a:r>
               <a:rPr lang="sl-SI" dirty="0"/>
-              <a:t>Izbrani ukaz si shrani v spomin, na to mesto pa zapiše:</a:t>
+              <a:t>Sprožijo se, ko procesor ne more normalno delovati zaradi napake ali napačnih podatkov. </a:t>
+            </a:r>
+          </a:p>
+          <a:p>
+            <a:r>
+              <a:rPr lang="sl-SI" dirty="0"/>
+              <a:t>Past se lahko obravnava podobno kot prekinitev - sprožijo se enaki mehanizmi:</a:t>
             </a:r>
           </a:p>
           <a:p>
             <a:pPr lvl="1"/>
             <a:r>
-              <a:rPr lang="sl-SI" dirty="0"/>
-              <a:t>poseben ukaz (na x86 je to INT 3)</a:t>
-            </a:r>
+              <a:rPr lang="sl-SI" dirty="0" err="1"/>
+              <a:t>push</a:t>
+            </a:r>
+            <a:r>
+              <a:rPr lang="sl-SI" dirty="0"/>
+              <a:t> vseh registrov na </a:t>
+            </a:r>
+            <a:r>
+              <a:rPr lang="sl-SI" dirty="0" err="1"/>
+              <a:t>stack</a:t>
+            </a:r>
+            <a:endParaRPr lang="sl-SI" dirty="0"/>
           </a:p>
           <a:p>
             <a:pPr lvl="1"/>
             <a:r>
               <a:rPr lang="sl-SI" dirty="0"/>
-              <a:t>nedefinirano kodo (npr. pri ARM v ta namen rezervirane posebne kode, ki so v dokumentaciji označene kot nedefinirane, da se lahko uporabljajo v ta namen)</a:t>
-            </a:r>
-          </a:p>
-          <a:p>
+              <a:t>izvajanje prekinitvenega servisnega podprograma</a:t>
+            </a:r>
+          </a:p>
+          <a:p>
+            <a:pPr lvl="1"/>
+            <a:r>
+              <a:rPr lang="sl-SI" dirty="0"/>
+              <a:t>...</a:t>
+            </a:r>
+          </a:p>
+          <a:p>
+            <a:pPr lvl="1"/>
+            <a:r>
+              <a:rPr lang="sl-SI" dirty="0"/>
+              <a:t> le da jo sproži programska oprema namesto strojne. </a:t>
+            </a:r>
+          </a:p>
+          <a:p>
+            <a:r>
+              <a:rPr lang="sl-SI" dirty="0"/>
+              <a:t>Primeri sprožitve pasti:</a:t>
+            </a:r>
+          </a:p>
+          <a:p>
+            <a:pPr lvl="1"/>
+            <a:r>
+              <a:rPr lang="sl-SI" dirty="0"/>
+              <a:t>deljenje z 0</a:t>
+            </a:r>
+          </a:p>
+          <a:p>
+            <a:pPr lvl="1"/>
+            <a:r>
+              <a:rPr lang="sl-SI" dirty="0" err="1"/>
+              <a:t>breakpoint</a:t>
+            </a:r>
             <a:endParaRPr lang="sl-SI" dirty="0"/>
           </a:p>
           <a:p>
-            <a:r>
-              <a:rPr lang="sl-SI" dirty="0"/>
-              <a:t>V </a:t>
-            </a:r>
-            <a:r>
-              <a:rPr lang="sl-SI" dirty="0" err="1"/>
-              <a:t>gdb</a:t>
-            </a:r>
-            <a:r>
-              <a:rPr lang="sl-SI" dirty="0"/>
-              <a:t> lahko prekinitveno točko nastavimo z ukazom (</a:t>
-            </a:r>
-            <a:r>
-              <a:rPr lang="sl-SI" dirty="0" err="1"/>
-              <a:t>gdb</a:t>
-            </a:r>
-            <a:r>
-              <a:rPr lang="sl-SI" dirty="0"/>
-              <a:t>) </a:t>
-            </a:r>
-            <a:r>
-              <a:rPr lang="sl-SI" dirty="0" err="1"/>
-              <a:t>br</a:t>
-            </a:r>
-            <a:r>
-              <a:rPr lang="sl-SI" dirty="0"/>
-              <a:t> *ADDRESS.</a:t>
+            <a:pPr lvl="1"/>
+            <a:r>
+              <a:rPr lang="sl-SI" dirty="0"/>
+              <a:t>neznan ukaz</a:t>
             </a:r>
           </a:p>
         </p:txBody>
@@ -5945,7 +5307,7 @@
     </p:spTree>
     <p:extLst>
       <p:ext uri="{BB962C8B-B14F-4D97-AF65-F5344CB8AC3E}">
-        <p14:creationId xmlns:p14="http://schemas.microsoft.com/office/powerpoint/2010/main" val="907681658"/>
+        <p14:creationId xmlns:p14="http://schemas.microsoft.com/office/powerpoint/2010/main" val="693203529"/>
       </p:ext>
     </p:extLst>
   </p:cSld>
@@ -5977,7 +5339,7 @@
           <p:cNvPr id="2" name="Title 1">
             <a:extLst>
               <a:ext uri="{FF2B5EF4-FFF2-40B4-BE49-F238E27FC236}">
-                <a16:creationId xmlns:a16="http://schemas.microsoft.com/office/drawing/2014/main" id="{A3450B84-8CB5-4E78-AFC4-4E515B387F07}"/>
+                <a16:creationId xmlns:a16="http://schemas.microsoft.com/office/drawing/2014/main" id="{C116077A-6C22-4AEF-A71C-5A44D6C83D89}"/>
               </a:ext>
             </a:extLst>
           </p:cNvPr>
@@ -5995,7 +5357,7 @@
           <a:p>
             <a:r>
               <a:rPr lang="sl-SI" dirty="0"/>
-              <a:t>PASTI</a:t>
+              <a:t>PASTI – INT X</a:t>
             </a:r>
           </a:p>
         </p:txBody>
@@ -6005,7 +5367,7 @@
           <p:cNvPr id="3" name="Content Placeholder 2">
             <a:extLst>
               <a:ext uri="{FF2B5EF4-FFF2-40B4-BE49-F238E27FC236}">
-                <a16:creationId xmlns:a16="http://schemas.microsoft.com/office/drawing/2014/main" id="{E1AD1311-F5FD-4565-961E-FDE71F9CE5E9}"/>
+                <a16:creationId xmlns:a16="http://schemas.microsoft.com/office/drawing/2014/main" id="{A2C6800B-430A-47F2-80D5-CF004C2F83D3}"/>
               </a:ext>
             </a:extLst>
           </p:cNvPr>
@@ -6019,39 +5381,67 @@
         <p:spPr>
           <a:xfrm>
             <a:off x="2231136" y="2638044"/>
-            <a:ext cx="7729728" cy="3664990"/>
+            <a:ext cx="8316094" cy="3664990"/>
           </a:xfrm>
         </p:spPr>
         <p:txBody>
           <a:bodyPr>
-            <a:normAutofit fontScale="92500" lnSpcReduction="10000"/>
+            <a:normAutofit fontScale="92500" lnSpcReduction="20000"/>
           </a:bodyPr>
           <a:lstStyle/>
           <a:p>
             <a:r>
               <a:rPr lang="sl-SI" dirty="0"/>
-              <a:t>Sprožijo se, ko procesor ne more normalno delovati zaradi napake ali napačnih podatkov. </a:t>
-            </a:r>
-          </a:p>
-          <a:p>
-            <a:r>
-              <a:rPr lang="sl-SI" dirty="0"/>
-              <a:t>Past se lahko obravnava podobno kot prekinitev - sprožijo se enaki mehanizmi:</a:t>
+              <a:t>Večina CPE ima posebne ukaze za proženje pasti za </a:t>
+            </a:r>
+            <a:r>
+              <a:rPr lang="sl-SI" dirty="0" err="1"/>
+              <a:t>debugger</a:t>
+            </a:r>
+            <a:endParaRPr lang="sl-SI" dirty="0"/>
+          </a:p>
+          <a:p>
+            <a:r>
+              <a:rPr lang="sl-SI" dirty="0"/>
+              <a:t>Na x86 arhitekturi je to ukaz INT 3</a:t>
+            </a:r>
+          </a:p>
+          <a:p>
+            <a:r>
+              <a:rPr lang="sl-SI" dirty="0"/>
+              <a:t>Sam ukaz INT X sproži programsko prekinitev, kjer X predstavlja </a:t>
+            </a:r>
+            <a:r>
+              <a:rPr lang="sl-SI" dirty="0" err="1"/>
+              <a:t>prekinitiev</a:t>
+            </a:r>
+            <a:r>
+              <a:rPr lang="sl-SI" dirty="0"/>
+              <a:t>, ki naj se sproži (0-255). </a:t>
             </a:r>
           </a:p>
           <a:p>
             <a:pPr lvl="1"/>
             <a:r>
-              <a:rPr lang="sl-SI" dirty="0" err="1"/>
-              <a:t>push</a:t>
-            </a:r>
-            <a:r>
-              <a:rPr lang="sl-SI" dirty="0"/>
-              <a:t> vseh registrov na </a:t>
-            </a:r>
-            <a:r>
-              <a:rPr lang="sl-SI" dirty="0" err="1"/>
-              <a:t>stack</a:t>
+              <a:rPr lang="sl-SI" dirty="0"/>
+              <a:t>Npr., ukaz INT 0x21 (33 v desetiškem sistemu) bo PC nastavil na 34. vektor v prekinitveni tabeli</a:t>
+            </a:r>
+          </a:p>
+          <a:p>
+            <a:r>
+              <a:rPr lang="sl-SI" dirty="0"/>
+              <a:t>Ene izmed bolj znanih prekinitev na x86 so:</a:t>
+            </a:r>
+          </a:p>
+          <a:p>
+            <a:pPr lvl="1"/>
+            <a:r>
+              <a:rPr lang="sl-SI" dirty="0"/>
+              <a:t>INT 0x21 - MS-DOS API </a:t>
+            </a:r>
+            <a:r>
+              <a:rPr lang="sl-SI" dirty="0" err="1"/>
+              <a:t>call</a:t>
             </a:r>
             <a:endParaRPr lang="sl-SI" dirty="0"/>
           </a:p>
@@ -6059,57 +5449,48 @@
             <a:pPr lvl="1"/>
             <a:r>
               <a:rPr lang="sl-SI" dirty="0"/>
-              <a:t>izvajanje prekinitvenega servisnega podprograma</a:t>
+              <a:t>INT 0x80 - </a:t>
+            </a:r>
+            <a:r>
+              <a:rPr lang="sl-SI" dirty="0" err="1"/>
+              <a:t>Unix</a:t>
+            </a:r>
+            <a:r>
+              <a:rPr lang="sl-SI" dirty="0"/>
+              <a:t> sistemski klic</a:t>
             </a:r>
           </a:p>
           <a:p>
             <a:pPr lvl="1"/>
             <a:r>
               <a:rPr lang="sl-SI" dirty="0"/>
-              <a:t>...</a:t>
-            </a:r>
-          </a:p>
-          <a:p>
-            <a:pPr lvl="1"/>
-            <a:r>
-              <a:rPr lang="sl-SI" dirty="0"/>
-              <a:t> le da jo sproži programska oprema namesto strojne. </a:t>
-            </a:r>
-          </a:p>
-          <a:p>
-            <a:r>
-              <a:rPr lang="sl-SI" dirty="0"/>
-              <a:t>Primeri sprožitve pasti:</a:t>
-            </a:r>
-          </a:p>
-          <a:p>
-            <a:pPr lvl="1"/>
-            <a:r>
-              <a:rPr lang="sl-SI" dirty="0"/>
-              <a:t>deljenje z 0</a:t>
-            </a:r>
-          </a:p>
-          <a:p>
-            <a:pPr lvl="1"/>
-            <a:r>
-              <a:rPr lang="sl-SI" dirty="0" err="1"/>
-              <a:t>breakpoint</a:t>
-            </a:r>
+              <a:t>INT 3 – Namenjen razhroščevalnikom. </a:t>
+            </a:r>
+          </a:p>
+          <a:p>
+            <a:pPr lvl="2"/>
+            <a:r>
+              <a:rPr lang="sl-SI" dirty="0"/>
+              <a:t>Zapiše se le z enim bajtom - njegov </a:t>
+            </a:r>
+            <a:r>
+              <a:rPr lang="sl-SI" dirty="0" err="1"/>
+              <a:t>opcode</a:t>
+            </a:r>
+            <a:r>
+              <a:rPr lang="sl-SI" dirty="0"/>
+              <a:t> je 0xCC, čeprav se načeloma INT X zapiše z dvema bajtoma, torej 0xCD 0x03. Ker so nekateri ukazi na x86 lahko dolgi samo en bajt, s tem ob nastavitvi prekinitvene točke ne povozimo še drugih ukazov.</a:t>
+            </a:r>
+          </a:p>
+          <a:p>
             <a:endParaRPr lang="sl-SI" dirty="0"/>
-          </a:p>
-          <a:p>
-            <a:pPr lvl="1"/>
-            <a:r>
-              <a:rPr lang="sl-SI" dirty="0"/>
-              <a:t>neznan ukaz</a:t>
-            </a:r>
           </a:p>
         </p:txBody>
       </p:sp>
     </p:spTree>
     <p:extLst>
       <p:ext uri="{BB962C8B-B14F-4D97-AF65-F5344CB8AC3E}">
-        <p14:creationId xmlns:p14="http://schemas.microsoft.com/office/powerpoint/2010/main" val="693203529"/>
+        <p14:creationId xmlns:p14="http://schemas.microsoft.com/office/powerpoint/2010/main" val="255726157"/>
       </p:ext>
     </p:extLst>
   </p:cSld>
@@ -6141,7 +5522,7 @@
           <p:cNvPr id="2" name="Title 1">
             <a:extLst>
               <a:ext uri="{FF2B5EF4-FFF2-40B4-BE49-F238E27FC236}">
-                <a16:creationId xmlns:a16="http://schemas.microsoft.com/office/drawing/2014/main" id="{C116077A-6C22-4AEF-A71C-5A44D6C83D89}"/>
+                <a16:creationId xmlns:a16="http://schemas.microsoft.com/office/drawing/2014/main" id="{8EB95D22-8F0C-42AA-9238-C5D85D366720}"/>
               </a:ext>
             </a:extLst>
           </p:cNvPr>
@@ -6159,7 +5540,7 @@
           <a:p>
             <a:r>
               <a:rPr lang="sl-SI" dirty="0"/>
-              <a:t>PASTI – INT X</a:t>
+              <a:t>Izvedba BREAKPOINTA</a:t>
             </a:r>
           </a:p>
         </p:txBody>
@@ -6169,7 +5550,7 @@
           <p:cNvPr id="3" name="Content Placeholder 2">
             <a:extLst>
               <a:ext uri="{FF2B5EF4-FFF2-40B4-BE49-F238E27FC236}">
-                <a16:creationId xmlns:a16="http://schemas.microsoft.com/office/drawing/2014/main" id="{A2C6800B-430A-47F2-80D5-CF004C2F83D3}"/>
+                <a16:creationId xmlns:a16="http://schemas.microsoft.com/office/drawing/2014/main" id="{DFA2FC86-E467-4CDA-9BA9-E21D8169F6C9}"/>
               </a:ext>
             </a:extLst>
           </p:cNvPr>
@@ -6183,106 +5564,91 @@
         <p:spPr>
           <a:xfrm>
             <a:off x="2231136" y="2638044"/>
-            <a:ext cx="8316094" cy="3664990"/>
+            <a:ext cx="7861770" cy="3544220"/>
           </a:xfrm>
         </p:spPr>
         <p:txBody>
           <a:bodyPr>
-            <a:normAutofit fontScale="92500" lnSpcReduction="20000"/>
+            <a:normAutofit/>
           </a:bodyPr>
           <a:lstStyle/>
           <a:p>
             <a:r>
               <a:rPr lang="sl-SI" dirty="0"/>
-              <a:t>Večina CPE ima posebne ukaze za proženje pasti za </a:t>
-            </a:r>
-            <a:r>
-              <a:rPr lang="sl-SI" dirty="0" err="1"/>
-              <a:t>debugger</a:t>
+              <a:t>Ko CPE sproži past in pokliče OS, razhroščevalnik:</a:t>
+            </a:r>
+          </a:p>
+          <a:p>
+            <a:pPr marL="342900" indent="-342900">
+              <a:buAutoNum type="arabicPeriod"/>
+            </a:pPr>
+            <a:r>
+              <a:rPr lang="sl-SI" dirty="0"/>
+              <a:t>Zamenja past (INT 3) z prvotnim ukazom na tistem mestu</a:t>
+            </a:r>
+          </a:p>
+          <a:p>
+            <a:pPr marL="342900" indent="-342900">
+              <a:buAutoNum type="arabicPeriod"/>
+            </a:pPr>
+            <a:r>
+              <a:rPr lang="sl-SI" dirty="0"/>
+              <a:t>PC zmanjša za 1, ker se je po izvedbi pasti premaknil za eno predaleč</a:t>
+            </a:r>
+          </a:p>
+          <a:p>
+            <a:pPr marL="342900" indent="-342900">
+              <a:buAutoNum type="arabicPeriod"/>
+            </a:pPr>
+            <a:r>
+              <a:rPr lang="sl-SI" dirty="0"/>
+              <a:t>Poda nadzor uporabniku, in ta lahko vidi vrednosti spremenljivk, klicni sklad, itd.</a:t>
+            </a:r>
+          </a:p>
+          <a:p>
+            <a:pPr marL="342900" indent="-342900">
+              <a:buAutoNum type="arabicPeriod"/>
+            </a:pPr>
+            <a:r>
+              <a:rPr lang="sl-SI" dirty="0"/>
+              <a:t>Če uporabnik ne odstrani prekinitvene točke na tem mestu, razhroščevalnik na to mesto past spet doda. </a:t>
+            </a:r>
+          </a:p>
+          <a:p>
+            <a:pPr marL="228600" lvl="1" indent="0">
+              <a:buNone/>
+            </a:pPr>
+            <a:r>
+              <a:rPr lang="sl-SI" dirty="0"/>
+              <a:t>(Ker mora najprej izvesti še ta ukaz, jo najprej doda na naslednji ukaz, se s tem pri naslednjem ukazu ustavi, in jo zdaj nastavi na pravi ukaz, naslednjega pa spet nadomesti s </a:t>
+            </a:r>
+            <a:r>
+              <a:rPr lang="sl-SI" dirty="0" err="1"/>
+              <a:t>provtno</a:t>
+            </a:r>
+            <a:r>
+              <a:rPr lang="sl-SI" dirty="0"/>
+              <a:t> kodo in izvede).</a:t>
+            </a:r>
+          </a:p>
+          <a:p>
+            <a:r>
+              <a:rPr lang="sl-SI" dirty="0"/>
+              <a:t>Primer v </a:t>
+            </a:r>
+            <a:r>
+              <a:rPr lang="sl-SI" dirty="0" err="1"/>
+              <a:t>examples</a:t>
+            </a:r>
+            <a:r>
+              <a:rPr lang="sl-SI" dirty="0"/>
+              <a:t>/</a:t>
+            </a:r>
+            <a:r>
+              <a:rPr lang="en-GB" dirty="0"/>
+              <a:t>ptrace_setting_breakpoint_example.md</a:t>
             </a:r>
             <a:endParaRPr lang="sl-SI" dirty="0"/>
-          </a:p>
-          <a:p>
-            <a:r>
-              <a:rPr lang="sl-SI" dirty="0"/>
-              <a:t>Na x86 arhitekturi je to ukaz INT 3</a:t>
-            </a:r>
-          </a:p>
-          <a:p>
-            <a:r>
-              <a:rPr lang="sl-SI" dirty="0"/>
-              <a:t>Sam ukaz INT X sproži programsko prekinitev, kjer X predstavlja </a:t>
-            </a:r>
-            <a:r>
-              <a:rPr lang="sl-SI" dirty="0" err="1"/>
-              <a:t>prekinitiev</a:t>
-            </a:r>
-            <a:r>
-              <a:rPr lang="sl-SI" dirty="0"/>
-              <a:t>, ki naj se sproži (0-255). </a:t>
-            </a:r>
-          </a:p>
-          <a:p>
-            <a:pPr lvl="1"/>
-            <a:r>
-              <a:rPr lang="sl-SI" dirty="0"/>
-              <a:t>Npr., ukaz INT 0x21 (33 v desetiškem sistemu) bo PC nastavil na 34. vektor v prekinitveni tabeli</a:t>
-            </a:r>
-          </a:p>
-          <a:p>
-            <a:r>
-              <a:rPr lang="sl-SI" dirty="0"/>
-              <a:t>Ene izmed bolj znanih prekinitev na x86 so:</a:t>
-            </a:r>
-          </a:p>
-          <a:p>
-            <a:pPr lvl="1"/>
-            <a:r>
-              <a:rPr lang="sl-SI" dirty="0"/>
-              <a:t>INT 0x21 - MS-DOS API </a:t>
-            </a:r>
-            <a:r>
-              <a:rPr lang="sl-SI" dirty="0" err="1"/>
-              <a:t>call</a:t>
-            </a:r>
-            <a:endParaRPr lang="sl-SI" dirty="0"/>
-          </a:p>
-          <a:p>
-            <a:pPr lvl="1"/>
-            <a:r>
-              <a:rPr lang="sl-SI" dirty="0"/>
-              <a:t>INT 0x80 - </a:t>
-            </a:r>
-            <a:r>
-              <a:rPr lang="sl-SI" dirty="0" err="1"/>
-              <a:t>Unix</a:t>
-            </a:r>
-            <a:r>
-              <a:rPr lang="sl-SI" dirty="0"/>
-              <a:t> sistemski klic</a:t>
-            </a:r>
-          </a:p>
-          <a:p>
-            <a:pPr lvl="1"/>
-            <a:r>
-              <a:rPr lang="sl-SI" dirty="0"/>
-              <a:t>INT 3 – Namenjen razhroščevalnikom. </a:t>
-            </a:r>
-          </a:p>
-          <a:p>
-            <a:pPr lvl="2"/>
-            <a:r>
-              <a:rPr lang="sl-SI" dirty="0"/>
-              <a:t>Zapiše se le z enim bajtom - njegov </a:t>
-            </a:r>
-            <a:r>
-              <a:rPr lang="sl-SI" dirty="0" err="1"/>
-              <a:t>opcode</a:t>
-            </a:r>
-            <a:r>
-              <a:rPr lang="sl-SI" dirty="0"/>
-              <a:t> je 0xCC, čeprav se načeloma INT X zapiše z dvema bajtoma, torej 0xCD 0x03. Ker so nekateri ukazi na x86 lahko dolgi samo en bajt, s tem ob nastavitvi prekinitvene točke ne povozimo še drugih ukazov.</a:t>
-            </a:r>
           </a:p>
           <a:p>
             <a:endParaRPr lang="sl-SI" dirty="0"/>
@@ -6292,7 +5658,7 @@
     </p:spTree>
     <p:extLst>
       <p:ext uri="{BB962C8B-B14F-4D97-AF65-F5344CB8AC3E}">
-        <p14:creationId xmlns:p14="http://schemas.microsoft.com/office/powerpoint/2010/main" val="255726157"/>
+        <p14:creationId xmlns:p14="http://schemas.microsoft.com/office/powerpoint/2010/main" val="2952572422"/>
       </p:ext>
     </p:extLst>
   </p:cSld>
@@ -6324,7 +5690,7 @@
           <p:cNvPr id="2" name="Title 1">
             <a:extLst>
               <a:ext uri="{FF2B5EF4-FFF2-40B4-BE49-F238E27FC236}">
-                <a16:creationId xmlns:a16="http://schemas.microsoft.com/office/drawing/2014/main" id="{8EB95D22-8F0C-42AA-9238-C5D85D366720}"/>
+                <a16:creationId xmlns:a16="http://schemas.microsoft.com/office/drawing/2014/main" id="{09CB5090-2610-43A4-A4F4-7C7AFBB46BC1}"/>
               </a:ext>
             </a:extLst>
           </p:cNvPr>
@@ -6341,9 +5707,18 @@
           <a:lstStyle/>
           <a:p>
             <a:r>
-              <a:rPr lang="sl-SI" dirty="0"/>
-              <a:t>Izvedba BREAKPOINTA</a:t>
-            </a:r>
+              <a:rPr lang="sl-SI" dirty="0" err="1"/>
+              <a:t>conditional</a:t>
+            </a:r>
+            <a:r>
+              <a:rPr lang="sl-SI" dirty="0"/>
+              <a:t> </a:t>
+            </a:r>
+            <a:r>
+              <a:rPr lang="sl-SI" dirty="0" err="1"/>
+              <a:t>breakpoint</a:t>
+            </a:r>
+            <a:endParaRPr lang="sl-SI" dirty="0"/>
           </a:p>
         </p:txBody>
       </p:sp>
@@ -6352,7 +5727,7 @@
           <p:cNvPr id="3" name="Content Placeholder 2">
             <a:extLst>
               <a:ext uri="{FF2B5EF4-FFF2-40B4-BE49-F238E27FC236}">
-                <a16:creationId xmlns:a16="http://schemas.microsoft.com/office/drawing/2014/main" id="{DFA2FC86-E467-4CDA-9BA9-E21D8169F6C9}"/>
+                <a16:creationId xmlns:a16="http://schemas.microsoft.com/office/drawing/2014/main" id="{92C21904-1188-4012-B0C4-2564BB00653C}"/>
               </a:ext>
             </a:extLst>
           </p:cNvPr>
@@ -6363,21 +5738,34 @@
             <p:ph idx="1"/>
           </p:nvPr>
         </p:nvSpPr>
-        <p:spPr>
-          <a:xfrm>
-            <a:off x="2231136" y="2638044"/>
-            <a:ext cx="7861770" cy="3544220"/>
-          </a:xfrm>
-        </p:spPr>
-        <p:txBody>
-          <a:bodyPr>
-            <a:normAutofit/>
-          </a:bodyPr>
-          <a:lstStyle/>
-          <a:p>
-            <a:r>
-              <a:rPr lang="sl-SI" dirty="0"/>
-              <a:t>Ko CPE sproži past in pokliče OS, </a:t>
+        <p:spPr/>
+        <p:txBody>
+          <a:bodyPr/>
+          <a:lstStyle/>
+          <a:p>
+            <a:r>
+              <a:rPr lang="sl-SI" dirty="0"/>
+              <a:t>Izvedejo se le ob izpolnitvi danih pogojev</a:t>
+            </a:r>
+          </a:p>
+          <a:p>
+            <a:r>
+              <a:rPr lang="sl-SI" dirty="0"/>
+              <a:t>Navadne prekinitvene točke, nato pa preveri, če se pogoji ujemajo danim podatkom, in le v tem primeru poda nadzor uporabniku</a:t>
+            </a:r>
+          </a:p>
+          <a:p>
+            <a:r>
+              <a:rPr lang="sl-SI" dirty="0"/>
+              <a:t>Počasno za </a:t>
+            </a:r>
+            <a:r>
+              <a:rPr lang="sl-SI" dirty="0" err="1"/>
+              <a:t>remote</a:t>
+            </a:r>
+            <a:r>
+              <a:rPr lang="sl-SI" dirty="0"/>
+              <a:t> </a:t>
             </a:r>
             <a:r>
               <a:rPr lang="sl-SI" dirty="0" err="1"/>
@@ -6385,71 +5773,54 @@
             </a:r>
             <a:r>
               <a:rPr lang="sl-SI" dirty="0"/>
-              <a:t>:</a:t>
-            </a:r>
-          </a:p>
-          <a:p>
-            <a:pPr marL="342900" indent="-342900">
-              <a:buAutoNum type="arabicPeriod"/>
-            </a:pPr>
-            <a:r>
-              <a:rPr lang="sl-SI" dirty="0"/>
-              <a:t>Zamenja past (INT 3) z prvotnim ukazom na tistem mestu</a:t>
-            </a:r>
-          </a:p>
-          <a:p>
-            <a:pPr marL="342900" indent="-342900">
-              <a:buAutoNum type="arabicPeriod"/>
-            </a:pPr>
-            <a:r>
-              <a:rPr lang="sl-SI" dirty="0"/>
-              <a:t>PC zmanjša za 1, ker se je po izvedbi pasti premaknil za eno predaleč</a:t>
-            </a:r>
-          </a:p>
-          <a:p>
-            <a:pPr marL="342900" indent="-342900">
-              <a:buAutoNum type="arabicPeriod"/>
-            </a:pPr>
-            <a:r>
-              <a:rPr lang="sl-SI" dirty="0"/>
-              <a:t>Poda nadzor uporabniku, in ta lahko vidi vrednosti spremenljivk, klicni sklad, itd.</a:t>
-            </a:r>
-          </a:p>
-          <a:p>
-            <a:pPr marL="342900" indent="-342900">
-              <a:buAutoNum type="arabicPeriod"/>
-            </a:pPr>
-            <a:r>
-              <a:rPr lang="sl-SI" dirty="0"/>
-              <a:t>Če uporabnik ne odstrani prekinitvene točke na tem mestu, razhroščevalnik na to mesto past spet doda. </a:t>
-            </a:r>
-          </a:p>
-          <a:p>
-            <a:pPr marL="228600" lvl="1" indent="0">
-              <a:buNone/>
-            </a:pPr>
-            <a:r>
-              <a:rPr lang="sl-SI" dirty="0"/>
-              <a:t>(Ker mora najprej izvesti še ta ukaz, jo najprej doda na naslednji ukaz, se s tem pri naslednjem ukazu ustavi, in jo zdaj nastavi na pravi ukaz, naslednjega pa spet nadomesti s </a:t>
-            </a:r>
-            <a:r>
-              <a:rPr lang="sl-SI" dirty="0" err="1"/>
-              <a:t>provtno</a:t>
-            </a:r>
-            <a:r>
-              <a:rPr lang="sl-SI" dirty="0"/>
-              <a:t> kodo in izvede).</a:t>
-            </a:r>
-          </a:p>
-          <a:p>
-            <a:endParaRPr lang="sl-SI" dirty="0"/>
+              <a:t>…</a:t>
+            </a:r>
+          </a:p>
+          <a:p>
+            <a:pPr lvl="1"/>
+            <a:r>
+              <a:rPr lang="sl-SI" dirty="0"/>
+              <a:t>prenos iz ciljne naprave na uporabnikovo napravo predstavlja veliko </a:t>
+            </a:r>
+            <a:r>
+              <a:rPr lang="sl-SI" dirty="0" err="1"/>
+              <a:t>overheada</a:t>
+            </a:r>
+            <a:r>
+              <a:rPr lang="sl-SI" dirty="0"/>
+              <a:t>, zato lahko pogoje preko </a:t>
+            </a:r>
+            <a:r>
+              <a:rPr lang="sl-SI" dirty="0" err="1"/>
+              <a:t>gdb</a:t>
+            </a:r>
+            <a:r>
+              <a:rPr lang="sl-SI" dirty="0"/>
+              <a:t> </a:t>
+            </a:r>
+            <a:r>
+              <a:rPr lang="sl-SI" dirty="0" err="1"/>
+              <a:t>stuba</a:t>
+            </a:r>
+            <a:r>
+              <a:rPr lang="sl-SI" dirty="0"/>
+              <a:t> preverimo kar na ciljni napravi, ali pa uporabimo </a:t>
+            </a:r>
+            <a:r>
+              <a:rPr lang="sl-SI" dirty="0" err="1"/>
+              <a:t>interpreter</a:t>
+            </a:r>
+            <a:r>
+              <a:rPr lang="sl-SI" dirty="0"/>
+              <a:t>, naložen kot deljen objekt znotraj ciljnega programa.</a:t>
+            </a:r>
           </a:p>
         </p:txBody>
       </p:sp>
     </p:spTree>
     <p:extLst>
       <p:ext uri="{BB962C8B-B14F-4D97-AF65-F5344CB8AC3E}">
-        <p14:creationId xmlns:p14="http://schemas.microsoft.com/office/powerpoint/2010/main" val="2952572422"/>
+        <p14:creationId xmlns:p14="http://schemas.microsoft.com/office/powerpoint/2010/main" val="2965761863"/>
       </p:ext>
     </p:extLst>
   </p:cSld>
@@ -6608,7 +5979,7 @@
           <p:cNvPr id="2" name="Title 1">
             <a:extLst>
               <a:ext uri="{FF2B5EF4-FFF2-40B4-BE49-F238E27FC236}">
-                <a16:creationId xmlns:a16="http://schemas.microsoft.com/office/drawing/2014/main" id="{09CF07B1-EC3A-4938-9444-14990463B2D1}"/>
+                <a16:creationId xmlns:a16="http://schemas.microsoft.com/office/drawing/2014/main" id="{A7512541-AB65-4737-9B7F-842B7E8DDC58}"/>
               </a:ext>
             </a:extLst>
           </p:cNvPr>
@@ -6626,11 +5997,11 @@
           <a:p>
             <a:r>
               <a:rPr lang="sl-SI" dirty="0"/>
-              <a:t>Primer – izvedba </a:t>
-            </a:r>
-            <a:r>
-              <a:rPr lang="sl-SI" dirty="0" err="1"/>
-              <a:t>breakpointa</a:t>
+              <a:t>software </a:t>
+            </a:r>
+            <a:r>
+              <a:rPr lang="sl-SI" dirty="0" err="1"/>
+              <a:t>breakpoints</a:t>
             </a:r>
             <a:endParaRPr lang="sl-SI" dirty="0"/>
           </a:p>
@@ -6641,7 +6012,7 @@
           <p:cNvPr id="3" name="Content Placeholder 2">
             <a:extLst>
               <a:ext uri="{FF2B5EF4-FFF2-40B4-BE49-F238E27FC236}">
-                <a16:creationId xmlns:a16="http://schemas.microsoft.com/office/drawing/2014/main" id="{6DE55313-8551-41DF-99E6-8E021B235CD0}"/>
+                <a16:creationId xmlns:a16="http://schemas.microsoft.com/office/drawing/2014/main" id="{24D2BB39-9EB3-47BD-AB6D-80BBC765C22D}"/>
               </a:ext>
             </a:extLst>
           </p:cNvPr>
@@ -6658,16 +6029,55 @@
           <a:lstStyle/>
           <a:p>
             <a:r>
-              <a:rPr lang="sl-SI" dirty="0" err="1"/>
-              <a:t>examples</a:t>
-            </a:r>
-            <a:r>
-              <a:rPr lang="sl-SI" dirty="0"/>
-              <a:t>/</a:t>
-            </a:r>
-            <a:r>
-              <a:rPr lang="en-GB" dirty="0"/>
-              <a:t>ptrace_setting_breakpoint_example.md</a:t>
+              <a:rPr lang="sl-SI" dirty="0"/>
+              <a:t>To, kar smo si pogledali do zdaj</a:t>
+            </a:r>
+          </a:p>
+          <a:p>
+            <a:r>
+              <a:rPr lang="sl-SI" dirty="0"/>
+              <a:t>Ni omejitve v </a:t>
+            </a:r>
+            <a:r>
+              <a:rPr lang="sl-SI" dirty="0" err="1"/>
+              <a:t>števillu</a:t>
+            </a:r>
+            <a:endParaRPr lang="sl-SI" dirty="0"/>
+          </a:p>
+          <a:p>
+            <a:r>
+              <a:rPr lang="sl-SI" dirty="0"/>
+              <a:t>Potrebujemo spremeniti program</a:t>
+            </a:r>
+          </a:p>
+          <a:p>
+            <a:pPr lvl="1"/>
+            <a:r>
+              <a:rPr lang="sl-SI" dirty="0"/>
+              <a:t>lahko je nevarno</a:t>
+            </a:r>
+          </a:p>
+          <a:p>
+            <a:pPr lvl="1"/>
+            <a:r>
+              <a:rPr lang="sl-SI" dirty="0" err="1"/>
+              <a:t>memory</a:t>
+            </a:r>
+            <a:r>
+              <a:rPr lang="sl-SI" dirty="0"/>
+              <a:t> </a:t>
+            </a:r>
+            <a:r>
+              <a:rPr lang="sl-SI" dirty="0" err="1"/>
+              <a:t>write</a:t>
+            </a:r>
+            <a:r>
+              <a:rPr lang="sl-SI" dirty="0"/>
+              <a:t> </a:t>
+            </a:r>
+            <a:r>
+              <a:rPr lang="sl-SI" dirty="0" err="1"/>
+              <a:t>access</a:t>
             </a:r>
             <a:endParaRPr lang="sl-SI" dirty="0"/>
           </a:p>
@@ -6676,7 +6086,7 @@
     </p:spTree>
     <p:extLst>
       <p:ext uri="{BB962C8B-B14F-4D97-AF65-F5344CB8AC3E}">
-        <p14:creationId xmlns:p14="http://schemas.microsoft.com/office/powerpoint/2010/main" val="2501041114"/>
+        <p14:creationId xmlns:p14="http://schemas.microsoft.com/office/powerpoint/2010/main" val="1993042287"/>
       </p:ext>
     </p:extLst>
   </p:cSld>
@@ -6708,7 +6118,7 @@
           <p:cNvPr id="2" name="Title 1">
             <a:extLst>
               <a:ext uri="{FF2B5EF4-FFF2-40B4-BE49-F238E27FC236}">
-                <a16:creationId xmlns:a16="http://schemas.microsoft.com/office/drawing/2014/main" id="{09CB5090-2610-43A4-A4F4-7C7AFBB46BC1}"/>
+                <a16:creationId xmlns:a16="http://schemas.microsoft.com/office/drawing/2014/main" id="{69AF6DA7-C27C-4D9E-B1EC-858AD0D094A9}"/>
               </a:ext>
             </a:extLst>
           </p:cNvPr>
@@ -6726,17 +6136,12 @@
           <a:p>
             <a:r>
               <a:rPr lang="sl-SI" dirty="0" err="1"/>
-              <a:t>conditional</a:t>
-            </a:r>
-            <a:r>
-              <a:rPr lang="sl-SI" dirty="0"/>
-              <a:t> </a:t>
-            </a:r>
-            <a:r>
-              <a:rPr lang="sl-SI" dirty="0" err="1"/>
-              <a:t>breakpoint</a:t>
-            </a:r>
-            <a:endParaRPr lang="sl-SI" dirty="0"/>
+              <a:t>Debug</a:t>
+            </a:r>
+            <a:r>
+              <a:rPr lang="sl-SI" dirty="0"/>
+              <a:t> hardware</a:t>
+            </a:r>
           </a:p>
         </p:txBody>
       </p:sp>
@@ -6745,7 +6150,7 @@
           <p:cNvPr id="3" name="Content Placeholder 2">
             <a:extLst>
               <a:ext uri="{FF2B5EF4-FFF2-40B4-BE49-F238E27FC236}">
-                <a16:creationId xmlns:a16="http://schemas.microsoft.com/office/drawing/2014/main" id="{92C21904-1188-4012-B0C4-2564BB00653C}"/>
+                <a16:creationId xmlns:a16="http://schemas.microsoft.com/office/drawing/2014/main" id="{2EA55E6F-2B7A-4184-BA9C-66B716EE9925}"/>
               </a:ext>
             </a:extLst>
           </p:cNvPr>
@@ -6763,23 +6168,45 @@
           <a:p>
             <a:r>
               <a:rPr lang="sl-SI" dirty="0"/>
-              <a:t>Izvedejo se le ob izpolnitvi danih pogojev</a:t>
-            </a:r>
-          </a:p>
-          <a:p>
-            <a:r>
-              <a:rPr lang="sl-SI" dirty="0"/>
-              <a:t>Navadne prekinitvene točke, nato pa preveri, če se pogoji ujemajo danim podatkom, in le v tem primeru poda nadzor uporabniku</a:t>
-            </a:r>
-          </a:p>
-          <a:p>
-            <a:r>
-              <a:rPr lang="sl-SI" dirty="0"/>
-              <a:t>Počasno za </a:t>
-            </a:r>
-            <a:r>
-              <a:rPr lang="sl-SI" dirty="0" err="1"/>
-              <a:t>remote</a:t>
+              <a:t>Strojna oprema lahko pomaga</a:t>
+            </a:r>
+          </a:p>
+          <a:p>
+            <a:pPr lvl="1"/>
+            <a:r>
+              <a:rPr lang="sl-SI" dirty="0" err="1"/>
+              <a:t>razhroščevanje</a:t>
+            </a:r>
+            <a:r>
+              <a:rPr lang="sl-SI" dirty="0"/>
+              <a:t> z ustavljanjem procesorja (</a:t>
+            </a:r>
+            <a:r>
+              <a:rPr lang="sl-SI" dirty="0" err="1"/>
+              <a:t>halting</a:t>
+            </a:r>
+            <a:r>
+              <a:rPr lang="sl-SI" dirty="0"/>
+              <a:t> mode </a:t>
+            </a:r>
+            <a:r>
+              <a:rPr lang="sl-SI" dirty="0" err="1"/>
+              <a:t>debugging</a:t>
+            </a:r>
+            <a:r>
+              <a:rPr lang="sl-SI" dirty="0"/>
+              <a:t>)</a:t>
+            </a:r>
+          </a:p>
+          <a:p>
+            <a:pPr lvl="1"/>
+            <a:r>
+              <a:rPr lang="sl-SI" dirty="0"/>
+              <a:t>enostavno izvajanje korak za korakom (</a:t>
+            </a:r>
+            <a:r>
+              <a:rPr lang="sl-SI" dirty="0" err="1"/>
+              <a:t>single</a:t>
             </a:r>
             <a:r>
               <a:rPr lang="sl-SI" dirty="0"/>
@@ -6787,58 +6214,48 @@
             </a:r>
             <a:r>
               <a:rPr lang="sl-SI" dirty="0" err="1"/>
-              <a:t>debugger</a:t>
-            </a:r>
-            <a:r>
-              <a:rPr lang="sl-SI" dirty="0"/>
-              <a:t>…</a:t>
+              <a:t>stepping</a:t>
+            </a:r>
+            <a:r>
+              <a:rPr lang="sl-SI" dirty="0"/>
+              <a:t>)</a:t>
             </a:r>
           </a:p>
           <a:p>
             <a:pPr lvl="1"/>
             <a:r>
               <a:rPr lang="sl-SI" dirty="0"/>
-              <a:t>prenos iz ciljne naprave na uporabnikovo napravo predstavlja veliko </a:t>
-            </a:r>
-            <a:r>
-              <a:rPr lang="sl-SI" dirty="0" err="1"/>
-              <a:t>overheada</a:t>
-            </a:r>
-            <a:r>
-              <a:rPr lang="sl-SI" dirty="0"/>
-              <a:t>, zato lahko pogoje preko </a:t>
-            </a:r>
-            <a:r>
-              <a:rPr lang="sl-SI" dirty="0" err="1"/>
-              <a:t>gdb</a:t>
-            </a:r>
-            <a:r>
-              <a:rPr lang="sl-SI" dirty="0"/>
-              <a:t> </a:t>
-            </a:r>
-            <a:r>
-              <a:rPr lang="sl-SI" dirty="0" err="1"/>
-              <a:t>stuba</a:t>
-            </a:r>
-            <a:r>
-              <a:rPr lang="sl-SI" dirty="0"/>
-              <a:t> preverimo kar na ciljni napravi, ali pa uporabimo </a:t>
-            </a:r>
-            <a:r>
-              <a:rPr lang="sl-SI" dirty="0" err="1"/>
-              <a:t>interpreter</a:t>
-            </a:r>
-            <a:r>
-              <a:rPr lang="sl-SI" dirty="0"/>
-              <a:t>, naložen kot deljen objekt znotraj ciljnega programa.</a:t>
-            </a:r>
+              <a:t>strojna podpora za </a:t>
+            </a:r>
+            <a:r>
+              <a:rPr lang="sl-SI" dirty="0" err="1"/>
+              <a:t>breakpointe</a:t>
+            </a:r>
+            <a:r>
+              <a:rPr lang="sl-SI" dirty="0"/>
+              <a:t> in </a:t>
+            </a:r>
+            <a:r>
+              <a:rPr lang="sl-SI" dirty="0" err="1"/>
+              <a:t>watchpointe</a:t>
+            </a:r>
+            <a:endParaRPr lang="sl-SI" dirty="0"/>
+          </a:p>
+          <a:p>
+            <a:r>
+              <a:rPr lang="sl-SI" dirty="0"/>
+              <a:t>Drago glede na prostor na siliciju</a:t>
+            </a:r>
+          </a:p>
+          <a:p>
+            <a:endParaRPr lang="sl-SI" dirty="0"/>
           </a:p>
         </p:txBody>
       </p:sp>
     </p:spTree>
     <p:extLst>
       <p:ext uri="{BB962C8B-B14F-4D97-AF65-F5344CB8AC3E}">
-        <p14:creationId xmlns:p14="http://schemas.microsoft.com/office/powerpoint/2010/main" val="2965761863"/>
+        <p14:creationId xmlns:p14="http://schemas.microsoft.com/office/powerpoint/2010/main" val="2175856007"/>
       </p:ext>
     </p:extLst>
   </p:cSld>
@@ -6870,7 +6287,7 @@
           <p:cNvPr id="2" name="Title 1">
             <a:extLst>
               <a:ext uri="{FF2B5EF4-FFF2-40B4-BE49-F238E27FC236}">
-                <a16:creationId xmlns:a16="http://schemas.microsoft.com/office/drawing/2014/main" id="{A7512541-AB65-4737-9B7F-842B7E8DDC58}"/>
+                <a16:creationId xmlns:a16="http://schemas.microsoft.com/office/drawing/2014/main" id="{84C58061-4021-44DC-82D8-61666F345518}"/>
               </a:ext>
             </a:extLst>
           </p:cNvPr>
@@ -6888,11 +6305,11 @@
           <a:p>
             <a:r>
               <a:rPr lang="sl-SI" dirty="0"/>
-              <a:t>software </a:t>
-            </a:r>
-            <a:r>
-              <a:rPr lang="sl-SI" dirty="0" err="1"/>
-              <a:t>breakpoints</a:t>
+              <a:t>hardware </a:t>
+            </a:r>
+            <a:r>
+              <a:rPr lang="sl-SI" dirty="0" err="1"/>
+              <a:t>breakpoint</a:t>
             </a:r>
             <a:endParaRPr lang="sl-SI" dirty="0"/>
           </a:p>
@@ -6903,7 +6320,7 @@
           <p:cNvPr id="3" name="Content Placeholder 2">
             <a:extLst>
               <a:ext uri="{FF2B5EF4-FFF2-40B4-BE49-F238E27FC236}">
-                <a16:creationId xmlns:a16="http://schemas.microsoft.com/office/drawing/2014/main" id="{24D2BB39-9EB3-47BD-AB6D-80BBC765C22D}"/>
+                <a16:creationId xmlns:a16="http://schemas.microsoft.com/office/drawing/2014/main" id="{26E0191E-2727-446A-B94D-63C86B244C79}"/>
               </a:ext>
             </a:extLst>
           </p:cNvPr>
@@ -6920,39 +6337,22 @@
           <a:lstStyle/>
           <a:p>
             <a:r>
-              <a:rPr lang="sl-SI" dirty="0"/>
-              <a:t>To, kar smo si pogledali do zdaj</a:t>
-            </a:r>
-          </a:p>
-          <a:p>
-            <a:r>
-              <a:rPr lang="sl-SI" dirty="0"/>
-              <a:t>Ni omejitve v </a:t>
-            </a:r>
-            <a:r>
-              <a:rPr lang="sl-SI" dirty="0" err="1"/>
-              <a:t>števillu</a:t>
-            </a:r>
-            <a:endParaRPr lang="sl-SI" dirty="0"/>
-          </a:p>
-          <a:p>
-            <a:r>
-              <a:rPr lang="sl-SI" dirty="0"/>
-              <a:t>Potrebujemo spremeniti program</a:t>
-            </a:r>
-          </a:p>
-          <a:p>
-            <a:pPr lvl="1"/>
-            <a:r>
-              <a:rPr lang="sl-SI" dirty="0"/>
-              <a:t>lahko je nevarno</a:t>
-            </a:r>
-          </a:p>
-          <a:p>
-            <a:pPr lvl="1"/>
-            <a:r>
-              <a:rPr lang="sl-SI" dirty="0" err="1"/>
-              <a:t>memory</a:t>
+              <a:rPr lang="sl-SI" dirty="0" err="1"/>
+              <a:t>Komparator</a:t>
+            </a:r>
+            <a:r>
+              <a:rPr lang="sl-SI" dirty="0"/>
+              <a:t>, ki spremlja PC in primerja z programsko vneseno vrednostjo</a:t>
+            </a:r>
+          </a:p>
+          <a:p>
+            <a:r>
+              <a:rPr lang="sl-SI" dirty="0"/>
+              <a:t>Če se ujema, </a:t>
+            </a:r>
+            <a:r>
+              <a:rPr lang="sl-SI" dirty="0" err="1"/>
+              <a:t>fetch</a:t>
             </a:r>
             <a:r>
               <a:rPr lang="sl-SI" dirty="0"/>
@@ -6960,24 +6360,39 @@
             </a:r>
             <a:r>
               <a:rPr lang="sl-SI" dirty="0" err="1"/>
-              <a:t>write</a:t>
-            </a:r>
-            <a:r>
-              <a:rPr lang="sl-SI" dirty="0"/>
-              <a:t> </a:t>
-            </a:r>
-            <a:r>
-              <a:rPr lang="sl-SI" dirty="0" err="1"/>
-              <a:t>access</a:t>
-            </a:r>
-            <a:endParaRPr lang="sl-SI" dirty="0"/>
+              <a:t>exception</a:t>
+            </a:r>
+            <a:r>
+              <a:rPr lang="sl-SI" dirty="0"/>
+              <a:t> -&gt; SIGSEV ali SIGTRAP </a:t>
+            </a:r>
+          </a:p>
+          <a:p>
+            <a:r>
+              <a:rPr lang="sl-SI" dirty="0"/>
+              <a:t>Lahko dostopamo s posebnimi ukazi</a:t>
+            </a:r>
+          </a:p>
+          <a:p>
+            <a:r>
+              <a:rPr lang="sl-SI" dirty="0"/>
+              <a:t>O</a:t>
+            </a:r>
+            <a:r>
+              <a:rPr lang="sl-SI"/>
+              <a:t>mejeni </a:t>
+            </a:r>
+            <a:r>
+              <a:rPr lang="sl-SI" dirty="0"/>
+              <a:t>(na x86 npr. 4) </a:t>
+            </a:r>
           </a:p>
         </p:txBody>
       </p:sp>
     </p:spTree>
     <p:extLst>
       <p:ext uri="{BB962C8B-B14F-4D97-AF65-F5344CB8AC3E}">
-        <p14:creationId xmlns:p14="http://schemas.microsoft.com/office/powerpoint/2010/main" val="1993042287"/>
+        <p14:creationId xmlns:p14="http://schemas.microsoft.com/office/powerpoint/2010/main" val="3418445149"/>
       </p:ext>
     </p:extLst>
   </p:cSld>
@@ -7009,7 +6424,7 @@
           <p:cNvPr id="2" name="Title 1">
             <a:extLst>
               <a:ext uri="{FF2B5EF4-FFF2-40B4-BE49-F238E27FC236}">
-                <a16:creationId xmlns:a16="http://schemas.microsoft.com/office/drawing/2014/main" id="{69AF6DA7-C27C-4D9E-B1EC-858AD0D094A9}"/>
+                <a16:creationId xmlns:a16="http://schemas.microsoft.com/office/drawing/2014/main" id="{E21CBE2B-6CE2-4054-9B2E-AA715440C554}"/>
               </a:ext>
             </a:extLst>
           </p:cNvPr>
@@ -7027,12 +6442,9 @@
           <a:p>
             <a:r>
               <a:rPr lang="sl-SI" dirty="0" err="1"/>
-              <a:t>Debug</a:t>
-            </a:r>
-            <a:r>
-              <a:rPr lang="sl-SI" dirty="0"/>
-              <a:t> hardware</a:t>
-            </a:r>
+              <a:t>watchpoint</a:t>
+            </a:r>
+            <a:endParaRPr lang="sl-SI" dirty="0"/>
           </a:p>
         </p:txBody>
       </p:sp>
@@ -7041,7 +6453,7 @@
           <p:cNvPr id="3" name="Content Placeholder 2">
             <a:extLst>
               <a:ext uri="{FF2B5EF4-FFF2-40B4-BE49-F238E27FC236}">
-                <a16:creationId xmlns:a16="http://schemas.microsoft.com/office/drawing/2014/main" id="{2EA55E6F-2B7A-4184-BA9C-66B716EE9925}"/>
+                <a16:creationId xmlns:a16="http://schemas.microsoft.com/office/drawing/2014/main" id="{54C3A4A8-0F0F-4C35-B8BD-0F8F774CF051}"/>
               </a:ext>
             </a:extLst>
           </p:cNvPr>
@@ -7059,94 +6471,31 @@
           <a:p>
             <a:r>
               <a:rPr lang="sl-SI" dirty="0"/>
-              <a:t>strojna oprema lahko pomaga</a:t>
-            </a:r>
-          </a:p>
-          <a:p>
-            <a:pPr lvl="1"/>
-            <a:r>
-              <a:rPr lang="sl-SI" dirty="0" err="1"/>
-              <a:t>razhroščevanje</a:t>
-            </a:r>
-            <a:r>
-              <a:rPr lang="sl-SI" dirty="0"/>
-              <a:t> z ustavljanjem procesorja (</a:t>
-            </a:r>
-            <a:r>
-              <a:rPr lang="sl-SI" dirty="0" err="1"/>
-              <a:t>halting</a:t>
-            </a:r>
-            <a:r>
-              <a:rPr lang="sl-SI" dirty="0"/>
-              <a:t> mode </a:t>
-            </a:r>
-            <a:r>
-              <a:rPr lang="sl-SI" dirty="0" err="1"/>
-              <a:t>debugging</a:t>
-            </a:r>
-            <a:r>
-              <a:rPr lang="sl-SI" dirty="0"/>
-              <a:t>)</a:t>
-            </a:r>
-          </a:p>
-          <a:p>
-            <a:pPr lvl="1"/>
-            <a:r>
-              <a:rPr lang="sl-SI" dirty="0"/>
-              <a:t>enostavno izvajanje korak za korakom (</a:t>
-            </a:r>
-            <a:r>
-              <a:rPr lang="sl-SI" dirty="0" err="1"/>
-              <a:t>single</a:t>
-            </a:r>
-            <a:r>
-              <a:rPr lang="sl-SI" dirty="0"/>
-              <a:t> </a:t>
-            </a:r>
-            <a:r>
-              <a:rPr lang="sl-SI" dirty="0" err="1"/>
-              <a:t>stepping</a:t>
-            </a:r>
-            <a:r>
-              <a:rPr lang="sl-SI" dirty="0"/>
-              <a:t>)</a:t>
-            </a:r>
-          </a:p>
-          <a:p>
-            <a:pPr lvl="1"/>
-            <a:r>
-              <a:rPr lang="sl-SI" dirty="0"/>
-              <a:t>strojna podpora za </a:t>
-            </a:r>
-            <a:r>
-              <a:rPr lang="sl-SI" dirty="0" err="1"/>
-              <a:t>breakpointe</a:t>
-            </a:r>
-            <a:r>
-              <a:rPr lang="sl-SI" dirty="0"/>
-              <a:t> in </a:t>
-            </a:r>
-            <a:r>
-              <a:rPr lang="sl-SI" dirty="0" err="1"/>
-              <a:t>watchpointe</a:t>
-            </a:r>
-            <a:endParaRPr lang="sl-SI" dirty="0"/>
-          </a:p>
-          <a:p>
-            <a:r>
-              <a:rPr lang="sl-SI" dirty="0"/>
-              <a:t>drago glede na prostor na siliciju</a:t>
-            </a:r>
-          </a:p>
-          <a:p>
-            <a:endParaRPr lang="sl-SI" dirty="0"/>
+              <a:t>Prekinitvene točke v spominu</a:t>
+            </a:r>
+          </a:p>
+          <a:p>
+            <a:r>
+              <a:rPr lang="sl-SI" dirty="0"/>
+              <a:t>Pisanje, branje, ali oboje</a:t>
+            </a:r>
+          </a:p>
+          <a:p>
+            <a:r>
+              <a:rPr lang="sl-SI" dirty="0" err="1"/>
+              <a:t>Komparator</a:t>
+            </a:r>
+            <a:r>
+              <a:rPr lang="sl-SI" dirty="0"/>
+              <a:t>, ki spremlja vodilo z naslovom dostopa do spomina</a:t>
+            </a:r>
           </a:p>
         </p:txBody>
       </p:sp>
     </p:spTree>
     <p:extLst>
       <p:ext uri="{BB962C8B-B14F-4D97-AF65-F5344CB8AC3E}">
-        <p14:creationId xmlns:p14="http://schemas.microsoft.com/office/powerpoint/2010/main" val="2175856007"/>
+        <p14:creationId xmlns:p14="http://schemas.microsoft.com/office/powerpoint/2010/main" val="2777948457"/>
       </p:ext>
     </p:extLst>
   </p:cSld>
@@ -7178,7 +6527,7 @@
           <p:cNvPr id="2" name="Title 1">
             <a:extLst>
               <a:ext uri="{FF2B5EF4-FFF2-40B4-BE49-F238E27FC236}">
-                <a16:creationId xmlns:a16="http://schemas.microsoft.com/office/drawing/2014/main" id="{84C58061-4021-44DC-82D8-61666F345518}"/>
+                <a16:creationId xmlns:a16="http://schemas.microsoft.com/office/drawing/2014/main" id="{D9D1E52F-D430-46AB-BC14-AA30F0E90542}"/>
               </a:ext>
             </a:extLst>
           </p:cNvPr>
@@ -7196,11 +6545,11 @@
           <a:p>
             <a:r>
               <a:rPr lang="sl-SI" dirty="0"/>
-              <a:t>hardware </a:t>
-            </a:r>
-            <a:r>
-              <a:rPr lang="sl-SI" dirty="0" err="1"/>
-              <a:t>breakpoint</a:t>
+              <a:t>JTAG </a:t>
+            </a:r>
+            <a:r>
+              <a:rPr lang="sl-SI" dirty="0" err="1"/>
+              <a:t>DEBUGGEr</a:t>
             </a:r>
             <a:endParaRPr lang="sl-SI" dirty="0"/>
           </a:p>
@@ -7211,7 +6560,7 @@
           <p:cNvPr id="3" name="Content Placeholder 2">
             <a:extLst>
               <a:ext uri="{FF2B5EF4-FFF2-40B4-BE49-F238E27FC236}">
-                <a16:creationId xmlns:a16="http://schemas.microsoft.com/office/drawing/2014/main" id="{26E0191E-2727-446A-B94D-63C86B244C79}"/>
+                <a16:creationId xmlns:a16="http://schemas.microsoft.com/office/drawing/2014/main" id="{D1A30E5A-ADEB-41D7-9F0A-EA556FBEB2BD}"/>
               </a:ext>
             </a:extLst>
           </p:cNvPr>
@@ -7228,46 +6577,30 @@
           <a:lstStyle/>
           <a:p>
             <a:r>
-              <a:rPr lang="sl-SI" dirty="0" err="1"/>
-              <a:t>komparator</a:t>
-            </a:r>
-            <a:r>
-              <a:rPr lang="sl-SI" dirty="0"/>
-              <a:t>, ki spremlja PC in primerja z programsko vneseno vrednostjo</a:t>
-            </a:r>
-          </a:p>
-          <a:p>
-            <a:r>
-              <a:rPr lang="sl-SI" dirty="0"/>
-              <a:t>če se ujema, </a:t>
-            </a:r>
-            <a:r>
-              <a:rPr lang="sl-SI" dirty="0" err="1"/>
-              <a:t>fetch</a:t>
-            </a:r>
-            <a:r>
-              <a:rPr lang="sl-SI" dirty="0"/>
-              <a:t> </a:t>
-            </a:r>
-            <a:r>
-              <a:rPr lang="sl-SI" dirty="0" err="1"/>
-              <a:t>exception</a:t>
-            </a:r>
-            <a:r>
-              <a:rPr lang="sl-SI" dirty="0"/>
-              <a:t> -&gt; SIGSEV ali SIGTRAP </a:t>
-            </a:r>
-          </a:p>
-          <a:p>
-            <a:r>
-              <a:rPr lang="sl-SI" dirty="0"/>
-              <a:t>lahko dostopamo s posebnimi ukazi</a:t>
-            </a:r>
-          </a:p>
-          <a:p>
-            <a:r>
-              <a:rPr lang="sl-SI" dirty="0"/>
-              <a:t>omejeni (na x86 npr. 4) </a:t>
+              <a:rPr lang="sl-SI" dirty="0"/>
+              <a:t>Na vgrajenih sistemih poznamo več načinov, kako </a:t>
+            </a:r>
+            <a:r>
+              <a:rPr lang="sl-SI" dirty="0" err="1"/>
+              <a:t>razhroščevati</a:t>
+            </a:r>
+            <a:endParaRPr lang="sl-SI" dirty="0"/>
+          </a:p>
+          <a:p>
+            <a:r>
+              <a:rPr lang="sl-SI" dirty="0"/>
+              <a:t>Posebni protokoli za </a:t>
+            </a:r>
+            <a:r>
+              <a:rPr lang="sl-SI" dirty="0" err="1"/>
+              <a:t>debugganje</a:t>
+            </a:r>
+            <a:endParaRPr lang="sl-SI" dirty="0"/>
+          </a:p>
+          <a:p>
+            <a:r>
+              <a:rPr lang="sl-SI" dirty="0"/>
+              <a:t>Posebne komponente</a:t>
             </a:r>
           </a:p>
         </p:txBody>
@@ -7275,7 +6608,7 @@
     </p:spTree>
     <p:extLst>
       <p:ext uri="{BB962C8B-B14F-4D97-AF65-F5344CB8AC3E}">
-        <p14:creationId xmlns:p14="http://schemas.microsoft.com/office/powerpoint/2010/main" val="3418445149"/>
+        <p14:creationId xmlns:p14="http://schemas.microsoft.com/office/powerpoint/2010/main" val="3354056300"/>
       </p:ext>
     </p:extLst>
   </p:cSld>
@@ -7307,7 +6640,7 @@
           <p:cNvPr id="2" name="Title 1">
             <a:extLst>
               <a:ext uri="{FF2B5EF4-FFF2-40B4-BE49-F238E27FC236}">
-                <a16:creationId xmlns:a16="http://schemas.microsoft.com/office/drawing/2014/main" id="{E21CBE2B-6CE2-4054-9B2E-AA715440C554}"/>
+                <a16:creationId xmlns:a16="http://schemas.microsoft.com/office/drawing/2014/main" id="{4604CD6F-B8B0-4D9C-9A4C-3F306942C26E}"/>
               </a:ext>
             </a:extLst>
           </p:cNvPr>
@@ -7325,7 +6658,15 @@
           <a:p>
             <a:r>
               <a:rPr lang="sl-SI" dirty="0" err="1"/>
-              <a:t>watchpoint</a:t>
+              <a:t>Halting</a:t>
+            </a:r>
+            <a:r>
+              <a:rPr lang="sl-SI" dirty="0"/>
+              <a:t> mode </a:t>
+            </a:r>
+            <a:r>
+              <a:rPr lang="sl-SI" dirty="0" err="1"/>
+              <a:t>debugging</a:t>
             </a:r>
             <a:endParaRPr lang="sl-SI" dirty="0"/>
           </a:p>
@@ -7336,7 +6677,7 @@
           <p:cNvPr id="3" name="Content Placeholder 2">
             <a:extLst>
               <a:ext uri="{FF2B5EF4-FFF2-40B4-BE49-F238E27FC236}">
-                <a16:creationId xmlns:a16="http://schemas.microsoft.com/office/drawing/2014/main" id="{54C3A4A8-0F0F-4C35-B8BD-0F8F774CF051}"/>
+                <a16:creationId xmlns:a16="http://schemas.microsoft.com/office/drawing/2014/main" id="{B06DF79B-8C01-4B9B-B713-68C65B2D4B5E}"/>
               </a:ext>
             </a:extLst>
           </p:cNvPr>
@@ -7349,28 +6690,58 @@
         </p:nvSpPr>
         <p:spPr/>
         <p:txBody>
-          <a:bodyPr/>
-          <a:lstStyle/>
-          <a:p>
-            <a:r>
-              <a:rPr lang="sl-SI" dirty="0"/>
-              <a:t>Prekinitvene točke v spominu</a:t>
-            </a:r>
-          </a:p>
-          <a:p>
-            <a:r>
-              <a:rPr lang="sl-SI" dirty="0"/>
-              <a:t>Pisanje, branje, ali oboje</a:t>
-            </a:r>
-          </a:p>
-          <a:p>
-            <a:r>
-              <a:rPr lang="sl-SI" dirty="0" err="1"/>
-              <a:t>Komparator</a:t>
-            </a:r>
-            <a:r>
-              <a:rPr lang="sl-SI" dirty="0"/>
-              <a:t>, ki spremlja vodilo z naslovom dostopa do spomina</a:t>
+          <a:bodyPr>
+            <a:normAutofit lnSpcReduction="10000"/>
+          </a:bodyPr>
+          <a:lstStyle/>
+          <a:p>
+            <a:r>
+              <a:rPr lang="sl-SI" dirty="0"/>
+              <a:t>Procesor ustavi izvajanje, ustavi uro</a:t>
+            </a:r>
+          </a:p>
+          <a:p>
+            <a:r>
+              <a:rPr lang="sl-SI" dirty="0"/>
+              <a:t>DMA, RTC, še vedno teče</a:t>
+            </a:r>
+          </a:p>
+          <a:p>
+            <a:r>
+              <a:rPr lang="sl-SI" dirty="0"/>
+              <a:t>Preko posebnega kanala lahko dostopamo do cevovoda in vstavljamo ukaze</a:t>
+            </a:r>
+          </a:p>
+          <a:p>
+            <a:r>
+              <a:rPr lang="sl-SI" dirty="0"/>
+              <a:t>Lahko dostopamo do posebnih sistemskih registrov</a:t>
+            </a:r>
+          </a:p>
+          <a:p>
+            <a:r>
+              <a:rPr lang="sl-SI" dirty="0"/>
+              <a:t>Do spomina lahko dostopamo z </a:t>
+            </a:r>
+            <a:r>
+              <a:rPr lang="sl-SI" dirty="0" err="1"/>
+              <a:t>load</a:t>
+            </a:r>
+            <a:r>
+              <a:rPr lang="sl-SI" dirty="0"/>
+              <a:t> in store ukazi -&gt; čez predpomnilnik, pravilne vrednosti spremenljivk</a:t>
+            </a:r>
+          </a:p>
+          <a:p>
+            <a:r>
+              <a:rPr lang="sl-SI" dirty="0"/>
+              <a:t>Veliko dela z pravilnim nadziranjem cevovoda, predpomnilnika…</a:t>
+            </a:r>
+          </a:p>
+          <a:p>
+            <a:r>
+              <a:rPr lang="sl-SI" dirty="0"/>
+              <a:t>Lahko pa dostopamo direktno na vodilo, a lahko dobimo napačne vrednosti zaradi predpomnilnika</a:t>
             </a:r>
           </a:p>
         </p:txBody>
@@ -7378,7 +6749,7 @@
     </p:spTree>
     <p:extLst>
       <p:ext uri="{BB962C8B-B14F-4D97-AF65-F5344CB8AC3E}">
-        <p14:creationId xmlns:p14="http://schemas.microsoft.com/office/powerpoint/2010/main" val="2777948457"/>
+        <p14:creationId xmlns:p14="http://schemas.microsoft.com/office/powerpoint/2010/main" val="2016166150"/>
       </p:ext>
     </p:extLst>
   </p:cSld>
@@ -7410,7 +6781,7 @@
           <p:cNvPr id="2" name="Title 1">
             <a:extLst>
               <a:ext uri="{FF2B5EF4-FFF2-40B4-BE49-F238E27FC236}">
-                <a16:creationId xmlns:a16="http://schemas.microsoft.com/office/drawing/2014/main" id="{D9D1E52F-D430-46AB-BC14-AA30F0E90542}"/>
+                <a16:creationId xmlns:a16="http://schemas.microsoft.com/office/drawing/2014/main" id="{FEAD3118-7FD1-4B91-88EA-4C8DBA037A32}"/>
               </a:ext>
             </a:extLst>
           </p:cNvPr>
@@ -7427,12 +6798,16 @@
           <a:lstStyle/>
           <a:p>
             <a:r>
-              <a:rPr lang="sl-SI" dirty="0"/>
-              <a:t>JTAG </a:t>
-            </a:r>
-            <a:r>
-              <a:rPr lang="sl-SI" dirty="0" err="1"/>
-              <a:t>DEBUGGEr</a:t>
+              <a:rPr lang="sl-SI" dirty="0" err="1"/>
+              <a:t>Debug</a:t>
+            </a:r>
+            <a:r>
+              <a:rPr lang="sl-SI" dirty="0"/>
+              <a:t> </a:t>
+            </a:r>
+            <a:r>
+              <a:rPr lang="sl-SI" dirty="0" err="1"/>
+              <a:t>information</a:t>
             </a:r>
             <a:endParaRPr lang="sl-SI" dirty="0"/>
           </a:p>
@@ -7443,7 +6818,7 @@
           <p:cNvPr id="3" name="Content Placeholder 2">
             <a:extLst>
               <a:ext uri="{FF2B5EF4-FFF2-40B4-BE49-F238E27FC236}">
-                <a16:creationId xmlns:a16="http://schemas.microsoft.com/office/drawing/2014/main" id="{D1A30E5A-ADEB-41D7-9F0A-EA556FBEB2BD}"/>
+                <a16:creationId xmlns:a16="http://schemas.microsoft.com/office/drawing/2014/main" id="{02EF352C-5DA8-4F94-B027-0DDE82C5DCE3}"/>
               </a:ext>
             </a:extLst>
           </p:cNvPr>
@@ -7461,29 +6836,21 @@
           <a:p>
             <a:r>
               <a:rPr lang="sl-SI" dirty="0"/>
-              <a:t>na vgrajenih sistemih poznamo več načinov, kako </a:t>
-            </a:r>
-            <a:r>
-              <a:rPr lang="sl-SI" dirty="0" err="1"/>
-              <a:t>razhroščevati</a:t>
-            </a:r>
-            <a:endParaRPr lang="sl-SI" dirty="0"/>
-          </a:p>
-          <a:p>
-            <a:r>
-              <a:rPr lang="sl-SI" dirty="0"/>
-              <a:t>posebni protokoli za </a:t>
-            </a:r>
-            <a:r>
-              <a:rPr lang="sl-SI" dirty="0" err="1"/>
-              <a:t>debugganje</a:t>
-            </a:r>
-            <a:endParaRPr lang="sl-SI" dirty="0"/>
-          </a:p>
-          <a:p>
-            <a:r>
-              <a:rPr lang="sl-SI" dirty="0"/>
-              <a:t>posebne komponente</a:t>
+              <a:t>Za </a:t>
+            </a:r>
+            <a:r>
+              <a:rPr lang="sl-SI" dirty="0" err="1"/>
+              <a:t>razhroščevanje</a:t>
+            </a:r>
+            <a:r>
+              <a:rPr lang="sl-SI" dirty="0"/>
+              <a:t> v višjih jezikih potrebujemo preslikavo iz izvorne kode v strojno kodo</a:t>
+            </a:r>
+          </a:p>
+          <a:p>
+            <a:r>
+              <a:rPr lang="sl-SI" dirty="0"/>
+              <a:t>Potrebujemo dodatne informacije, o funkcijah, spremenljivkah…</a:t>
             </a:r>
           </a:p>
         </p:txBody>
@@ -7491,7 +6858,7 @@
     </p:spTree>
     <p:extLst>
       <p:ext uri="{BB962C8B-B14F-4D97-AF65-F5344CB8AC3E}">
-        <p14:creationId xmlns:p14="http://schemas.microsoft.com/office/powerpoint/2010/main" val="3354056300"/>
+        <p14:creationId xmlns:p14="http://schemas.microsoft.com/office/powerpoint/2010/main" val="272533302"/>
       </p:ext>
     </p:extLst>
   </p:cSld>
@@ -7523,256 +6890,6 @@
           <p:cNvPr id="2" name="Title 1">
             <a:extLst>
               <a:ext uri="{FF2B5EF4-FFF2-40B4-BE49-F238E27FC236}">
-                <a16:creationId xmlns:a16="http://schemas.microsoft.com/office/drawing/2014/main" id="{4604CD6F-B8B0-4D9C-9A4C-3F306942C26E}"/>
-              </a:ext>
-            </a:extLst>
-          </p:cNvPr>
-          <p:cNvSpPr>
-            <a:spLocks noGrp="1"/>
-          </p:cNvSpPr>
-          <p:nvPr>
-            <p:ph type="title"/>
-          </p:nvPr>
-        </p:nvSpPr>
-        <p:spPr/>
-        <p:txBody>
-          <a:bodyPr/>
-          <a:lstStyle/>
-          <a:p>
-            <a:r>
-              <a:rPr lang="sl-SI" dirty="0" err="1"/>
-              <a:t>Halting</a:t>
-            </a:r>
-            <a:r>
-              <a:rPr lang="sl-SI" dirty="0"/>
-              <a:t> mode </a:t>
-            </a:r>
-            <a:r>
-              <a:rPr lang="sl-SI" dirty="0" err="1"/>
-              <a:t>debugging</a:t>
-            </a:r>
-            <a:endParaRPr lang="sl-SI" dirty="0"/>
-          </a:p>
-        </p:txBody>
-      </p:sp>
-      <p:sp>
-        <p:nvSpPr>
-          <p:cNvPr id="3" name="Content Placeholder 2">
-            <a:extLst>
-              <a:ext uri="{FF2B5EF4-FFF2-40B4-BE49-F238E27FC236}">
-                <a16:creationId xmlns:a16="http://schemas.microsoft.com/office/drawing/2014/main" id="{B06DF79B-8C01-4B9B-B713-68C65B2D4B5E}"/>
-              </a:ext>
-            </a:extLst>
-          </p:cNvPr>
-          <p:cNvSpPr>
-            <a:spLocks noGrp="1"/>
-          </p:cNvSpPr>
-          <p:nvPr>
-            <p:ph idx="1"/>
-          </p:nvPr>
-        </p:nvSpPr>
-        <p:spPr/>
-        <p:txBody>
-          <a:bodyPr>
-            <a:normAutofit lnSpcReduction="10000"/>
-          </a:bodyPr>
-          <a:lstStyle/>
-          <a:p>
-            <a:r>
-              <a:rPr lang="sl-SI" dirty="0"/>
-              <a:t>Procesor ustavi izvajanje, ustavi uro</a:t>
-            </a:r>
-          </a:p>
-          <a:p>
-            <a:r>
-              <a:rPr lang="sl-SI" dirty="0"/>
-              <a:t>DMA, RTC, še vedno teče</a:t>
-            </a:r>
-          </a:p>
-          <a:p>
-            <a:r>
-              <a:rPr lang="sl-SI" dirty="0"/>
-              <a:t>Preko posebnega kanala lahko dostopamo do cevovoda in vstavljamo ukaze</a:t>
-            </a:r>
-          </a:p>
-          <a:p>
-            <a:r>
-              <a:rPr lang="sl-SI" dirty="0"/>
-              <a:t>Lahko dostopamo do posebnih sistemskih registrov</a:t>
-            </a:r>
-          </a:p>
-          <a:p>
-            <a:r>
-              <a:rPr lang="sl-SI" dirty="0"/>
-              <a:t>Do spomina lahko dostopamo z </a:t>
-            </a:r>
-            <a:r>
-              <a:rPr lang="sl-SI" dirty="0" err="1"/>
-              <a:t>load</a:t>
-            </a:r>
-            <a:r>
-              <a:rPr lang="sl-SI" dirty="0"/>
-              <a:t> in store ukazi -&gt; čez predpomnilnik, pravilne vrednosti spremenljivk</a:t>
-            </a:r>
-          </a:p>
-          <a:p>
-            <a:r>
-              <a:rPr lang="sl-SI" dirty="0"/>
-              <a:t>Veliko dela z pravilnim nadziranjem cevovoda, predpomnilnika…</a:t>
-            </a:r>
-          </a:p>
-          <a:p>
-            <a:r>
-              <a:rPr lang="sl-SI" dirty="0"/>
-              <a:t>Lahko pa dostopamo direktno na vodilo, a lahko dobimo napačne vrednosti zaradi predpomnilnika</a:t>
-            </a:r>
-          </a:p>
-        </p:txBody>
-      </p:sp>
-    </p:spTree>
-    <p:extLst>
-      <p:ext uri="{BB962C8B-B14F-4D97-AF65-F5344CB8AC3E}">
-        <p14:creationId xmlns:p14="http://schemas.microsoft.com/office/powerpoint/2010/main" val="2016166150"/>
-      </p:ext>
-    </p:extLst>
-  </p:cSld>
-  <p:clrMapOvr>
-    <a:masterClrMapping/>
-  </p:clrMapOvr>
-</p:sld>
-</file>
-
-<file path=ppt/slides/slide28.xml><?xml version="1.0" encoding="utf-8"?>
-<p:sld xmlns:a="http://schemas.openxmlformats.org/drawingml/2006/main" xmlns:r="http://schemas.openxmlformats.org/officeDocument/2006/relationships" xmlns:p="http://schemas.openxmlformats.org/presentationml/2006/main">
-  <p:cSld>
-    <p:spTree>
-      <p:nvGrpSpPr>
-        <p:cNvPr id="1" name=""/>
-        <p:cNvGrpSpPr/>
-        <p:nvPr/>
-      </p:nvGrpSpPr>
-      <p:grpSpPr>
-        <a:xfrm>
-          <a:off x="0" y="0"/>
-          <a:ext cx="0" cy="0"/>
-          <a:chOff x="0" y="0"/>
-          <a:chExt cx="0" cy="0"/>
-        </a:xfrm>
-      </p:grpSpPr>
-      <p:sp>
-        <p:nvSpPr>
-          <p:cNvPr id="2" name="Title 1">
-            <a:extLst>
-              <a:ext uri="{FF2B5EF4-FFF2-40B4-BE49-F238E27FC236}">
-                <a16:creationId xmlns:a16="http://schemas.microsoft.com/office/drawing/2014/main" id="{FEAD3118-7FD1-4B91-88EA-4C8DBA037A32}"/>
-              </a:ext>
-            </a:extLst>
-          </p:cNvPr>
-          <p:cNvSpPr>
-            <a:spLocks noGrp="1"/>
-          </p:cNvSpPr>
-          <p:nvPr>
-            <p:ph type="title"/>
-          </p:nvPr>
-        </p:nvSpPr>
-        <p:spPr/>
-        <p:txBody>
-          <a:bodyPr/>
-          <a:lstStyle/>
-          <a:p>
-            <a:r>
-              <a:rPr lang="sl-SI" dirty="0" err="1"/>
-              <a:t>Debug</a:t>
-            </a:r>
-            <a:r>
-              <a:rPr lang="sl-SI" dirty="0"/>
-              <a:t> </a:t>
-            </a:r>
-            <a:r>
-              <a:rPr lang="sl-SI" dirty="0" err="1"/>
-              <a:t>information</a:t>
-            </a:r>
-            <a:endParaRPr lang="sl-SI" dirty="0"/>
-          </a:p>
-        </p:txBody>
-      </p:sp>
-      <p:sp>
-        <p:nvSpPr>
-          <p:cNvPr id="3" name="Content Placeholder 2">
-            <a:extLst>
-              <a:ext uri="{FF2B5EF4-FFF2-40B4-BE49-F238E27FC236}">
-                <a16:creationId xmlns:a16="http://schemas.microsoft.com/office/drawing/2014/main" id="{02EF352C-5DA8-4F94-B027-0DDE82C5DCE3}"/>
-              </a:ext>
-            </a:extLst>
-          </p:cNvPr>
-          <p:cNvSpPr>
-            <a:spLocks noGrp="1"/>
-          </p:cNvSpPr>
-          <p:nvPr>
-            <p:ph idx="1"/>
-          </p:nvPr>
-        </p:nvSpPr>
-        <p:spPr/>
-        <p:txBody>
-          <a:bodyPr/>
-          <a:lstStyle/>
-          <a:p>
-            <a:r>
-              <a:rPr lang="sl-SI" dirty="0"/>
-              <a:t>Za </a:t>
-            </a:r>
-            <a:r>
-              <a:rPr lang="sl-SI" dirty="0" err="1"/>
-              <a:t>razhroščevanje</a:t>
-            </a:r>
-            <a:r>
-              <a:rPr lang="sl-SI" dirty="0"/>
-              <a:t> v višjih jezikih potrebujemo preslikavo iz izvorne kode v strojno kodo</a:t>
-            </a:r>
-          </a:p>
-          <a:p>
-            <a:r>
-              <a:rPr lang="sl-SI" dirty="0"/>
-              <a:t>Potrebujemo dodatne informacije, o funkcijah, spremenljivkah…</a:t>
-            </a:r>
-          </a:p>
-        </p:txBody>
-      </p:sp>
-    </p:spTree>
-    <p:extLst>
-      <p:ext uri="{BB962C8B-B14F-4D97-AF65-F5344CB8AC3E}">
-        <p14:creationId xmlns:p14="http://schemas.microsoft.com/office/powerpoint/2010/main" val="272533302"/>
-      </p:ext>
-    </p:extLst>
-  </p:cSld>
-  <p:clrMapOvr>
-    <a:masterClrMapping/>
-  </p:clrMapOvr>
-</p:sld>
-</file>
-
-<file path=ppt/slides/slide29.xml><?xml version="1.0" encoding="utf-8"?>
-<p:sld xmlns:a="http://schemas.openxmlformats.org/drawingml/2006/main" xmlns:r="http://schemas.openxmlformats.org/officeDocument/2006/relationships" xmlns:p="http://schemas.openxmlformats.org/presentationml/2006/main">
-  <p:cSld>
-    <p:spTree>
-      <p:nvGrpSpPr>
-        <p:cNvPr id="1" name=""/>
-        <p:cNvGrpSpPr/>
-        <p:nvPr/>
-      </p:nvGrpSpPr>
-      <p:grpSpPr>
-        <a:xfrm>
-          <a:off x="0" y="0"/>
-          <a:ext cx="0" cy="0"/>
-          <a:chOff x="0" y="0"/>
-          <a:chExt cx="0" cy="0"/>
-        </a:xfrm>
-      </p:grpSpPr>
-      <p:sp>
-        <p:nvSpPr>
-          <p:cNvPr id="2" name="Title 1">
-            <a:extLst>
-              <a:ext uri="{FF2B5EF4-FFF2-40B4-BE49-F238E27FC236}">
                 <a16:creationId xmlns:a16="http://schemas.microsoft.com/office/drawing/2014/main" id="{A28E0AB1-ACCB-49E7-B41E-BB3E9D1B8D06}"/>
               </a:ext>
             </a:extLst>
@@ -7849,165 +6966,7 @@
 </p:sld>
 </file>
 
-<file path=ppt/slides/slide3.xml><?xml version="1.0" encoding="utf-8"?>
-<p:sld xmlns:a="http://schemas.openxmlformats.org/drawingml/2006/main" xmlns:r="http://schemas.openxmlformats.org/officeDocument/2006/relationships" xmlns:p="http://schemas.openxmlformats.org/presentationml/2006/main">
-  <p:cSld>
-    <p:spTree>
-      <p:nvGrpSpPr>
-        <p:cNvPr id="1" name=""/>
-        <p:cNvGrpSpPr/>
-        <p:nvPr/>
-      </p:nvGrpSpPr>
-      <p:grpSpPr>
-        <a:xfrm>
-          <a:off x="0" y="0"/>
-          <a:ext cx="0" cy="0"/>
-          <a:chOff x="0" y="0"/>
-          <a:chExt cx="0" cy="0"/>
-        </a:xfrm>
-      </p:grpSpPr>
-      <p:sp>
-        <p:nvSpPr>
-          <p:cNvPr id="2" name="Title 1">
-            <a:extLst>
-              <a:ext uri="{FF2B5EF4-FFF2-40B4-BE49-F238E27FC236}">
-                <a16:creationId xmlns:a16="http://schemas.microsoft.com/office/drawing/2014/main" id="{E2435625-22F1-470E-8AC0-FAE620501F94}"/>
-              </a:ext>
-            </a:extLst>
-          </p:cNvPr>
-          <p:cNvSpPr>
-            <a:spLocks noGrp="1"/>
-          </p:cNvSpPr>
-          <p:nvPr>
-            <p:ph type="title"/>
-          </p:nvPr>
-        </p:nvSpPr>
-        <p:spPr/>
-        <p:txBody>
-          <a:bodyPr/>
-          <a:lstStyle/>
-          <a:p>
-            <a:r>
-              <a:rPr lang="sl-SI" dirty="0"/>
-              <a:t>Opis razhroščevalnikov</a:t>
-            </a:r>
-          </a:p>
-        </p:txBody>
-      </p:sp>
-      <p:sp>
-        <p:nvSpPr>
-          <p:cNvPr id="3" name="Content Placeholder 2">
-            <a:extLst>
-              <a:ext uri="{FF2B5EF4-FFF2-40B4-BE49-F238E27FC236}">
-                <a16:creationId xmlns:a16="http://schemas.microsoft.com/office/drawing/2014/main" id="{0B258169-40EB-4BAA-87A8-66897D7ADE78}"/>
-              </a:ext>
-            </a:extLst>
-          </p:cNvPr>
-          <p:cNvSpPr>
-            <a:spLocks noGrp="1"/>
-          </p:cNvSpPr>
-          <p:nvPr>
-            <p:ph idx="1"/>
-          </p:nvPr>
-        </p:nvSpPr>
-        <p:spPr/>
-        <p:txBody>
-          <a:bodyPr/>
-          <a:lstStyle/>
-          <a:p>
-            <a:r>
-              <a:rPr lang="sl-SI" b="1" dirty="0"/>
-              <a:t>program, s katerim testiramo ali </a:t>
-            </a:r>
-            <a:r>
-              <a:rPr lang="sl-SI" b="1" dirty="0" err="1"/>
-              <a:t>razhroščujemo</a:t>
-            </a:r>
-            <a:r>
-              <a:rPr lang="sl-SI" b="1" dirty="0"/>
-              <a:t> drug ("ciljni") program</a:t>
-            </a:r>
-            <a:endParaRPr lang="en-GB" b="1" dirty="0"/>
-          </a:p>
-          <a:p>
-            <a:r>
-              <a:rPr lang="en-GB" dirty="0"/>
-              <a:t>o</a:t>
-            </a:r>
-            <a:r>
-              <a:rPr lang="sl-SI" dirty="0" err="1"/>
-              <a:t>mogočajo</a:t>
-            </a:r>
-            <a:r>
-              <a:rPr lang="en-GB" dirty="0"/>
-              <a:t>:</a:t>
-            </a:r>
-          </a:p>
-          <a:p>
-            <a:pPr lvl="1"/>
-            <a:r>
-              <a:rPr lang="sl-SI" dirty="0"/>
-              <a:t> spremljanje poteka izvajanja ciljnega programa </a:t>
-            </a:r>
-            <a:endParaRPr lang="en-GB" dirty="0"/>
-          </a:p>
-          <a:p>
-            <a:pPr lvl="1"/>
-            <a:r>
-              <a:rPr lang="sl-SI" dirty="0"/>
-              <a:t>ob katerikoli točki </a:t>
-            </a:r>
-            <a:r>
-              <a:rPr lang="en-GB" dirty="0"/>
-              <a:t>la</a:t>
-            </a:r>
-            <a:r>
-              <a:rPr lang="sl-SI" dirty="0"/>
-              <a:t>h</a:t>
-            </a:r>
-            <a:r>
-              <a:rPr lang="en-GB" dirty="0" err="1"/>
-              <a:t>ko</a:t>
-            </a:r>
-            <a:r>
-              <a:rPr lang="en-GB" dirty="0"/>
-              <a:t> programmer </a:t>
-            </a:r>
-            <a:r>
-              <a:rPr lang="sl-SI" dirty="0"/>
-              <a:t>ustavi program ter pogleda stanje programa in preveri pravilnost njegovega delovanja.</a:t>
-            </a:r>
-          </a:p>
-          <a:p>
-            <a:r>
-              <a:rPr lang="sl-SI" dirty="0"/>
-              <a:t>lahko uporabljajo tudi </a:t>
-            </a:r>
-            <a:r>
-              <a:rPr lang="sl-SI" dirty="0" err="1"/>
-              <a:t>instruction</a:t>
-            </a:r>
-            <a:r>
-              <a:rPr lang="sl-SI" dirty="0"/>
-              <a:t> set simulator</a:t>
-            </a:r>
-          </a:p>
-        </p:txBody>
-      </p:sp>
-    </p:spTree>
-    <p:extLst>
-      <p:ext uri="{BB962C8B-B14F-4D97-AF65-F5344CB8AC3E}">
-        <p14:creationId xmlns:p14="http://schemas.microsoft.com/office/powerpoint/2010/main" val="2495267524"/>
-      </p:ext>
-    </p:extLst>
-  </p:cSld>
-  <p:clrMapOvr>
-    <a:masterClrMapping/>
-  </p:clrMapOvr>
-</p:sld>
-</file>
-
-<file path=ppt/slides/slide30.xml><?xml version="1.0" encoding="utf-8"?>
+<file path=ppt/slides/slide28.xml><?xml version="1.0" encoding="utf-8"?>
 <p:sld xmlns:a="http://schemas.openxmlformats.org/drawingml/2006/main" xmlns:r="http://schemas.openxmlformats.org/officeDocument/2006/relationships" xmlns:p="http://schemas.openxmlformats.org/presentationml/2006/main">
   <p:cSld>
     <p:spTree>
@@ -8206,7 +7165,7 @@
 </p:sld>
 </file>
 
-<file path=ppt/slides/slide31.xml><?xml version="1.0" encoding="utf-8"?>
+<file path=ppt/slides/slide29.xml><?xml version="1.0" encoding="utf-8"?>
 <p:sld xmlns:a="http://schemas.openxmlformats.org/drawingml/2006/main" xmlns:r="http://schemas.openxmlformats.org/officeDocument/2006/relationships" xmlns:p="http://schemas.openxmlformats.org/presentationml/2006/main">
   <p:cSld>
     <p:spTree>
@@ -8667,6 +7626,164 @@
     <p:extLst>
       <p:ext uri="{BB962C8B-B14F-4D97-AF65-F5344CB8AC3E}">
         <p14:creationId xmlns:p14="http://schemas.microsoft.com/office/powerpoint/2010/main" val="862404442"/>
+      </p:ext>
+    </p:extLst>
+  </p:cSld>
+  <p:clrMapOvr>
+    <a:masterClrMapping/>
+  </p:clrMapOvr>
+</p:sld>
+</file>
+
+<file path=ppt/slides/slide3.xml><?xml version="1.0" encoding="utf-8"?>
+<p:sld xmlns:a="http://schemas.openxmlformats.org/drawingml/2006/main" xmlns:r="http://schemas.openxmlformats.org/officeDocument/2006/relationships" xmlns:p="http://schemas.openxmlformats.org/presentationml/2006/main">
+  <p:cSld>
+    <p:spTree>
+      <p:nvGrpSpPr>
+        <p:cNvPr id="1" name=""/>
+        <p:cNvGrpSpPr/>
+        <p:nvPr/>
+      </p:nvGrpSpPr>
+      <p:grpSpPr>
+        <a:xfrm>
+          <a:off x="0" y="0"/>
+          <a:ext cx="0" cy="0"/>
+          <a:chOff x="0" y="0"/>
+          <a:chExt cx="0" cy="0"/>
+        </a:xfrm>
+      </p:grpSpPr>
+      <p:sp>
+        <p:nvSpPr>
+          <p:cNvPr id="2" name="Title 1">
+            <a:extLst>
+              <a:ext uri="{FF2B5EF4-FFF2-40B4-BE49-F238E27FC236}">
+                <a16:creationId xmlns:a16="http://schemas.microsoft.com/office/drawing/2014/main" id="{E2435625-22F1-470E-8AC0-FAE620501F94}"/>
+              </a:ext>
+            </a:extLst>
+          </p:cNvPr>
+          <p:cNvSpPr>
+            <a:spLocks noGrp="1"/>
+          </p:cNvSpPr>
+          <p:nvPr>
+            <p:ph type="title"/>
+          </p:nvPr>
+        </p:nvSpPr>
+        <p:spPr/>
+        <p:txBody>
+          <a:bodyPr/>
+          <a:lstStyle/>
+          <a:p>
+            <a:r>
+              <a:rPr lang="sl-SI" dirty="0"/>
+              <a:t>Opis razhroščevalnikov</a:t>
+            </a:r>
+          </a:p>
+        </p:txBody>
+      </p:sp>
+      <p:sp>
+        <p:nvSpPr>
+          <p:cNvPr id="3" name="Content Placeholder 2">
+            <a:extLst>
+              <a:ext uri="{FF2B5EF4-FFF2-40B4-BE49-F238E27FC236}">
+                <a16:creationId xmlns:a16="http://schemas.microsoft.com/office/drawing/2014/main" id="{0B258169-40EB-4BAA-87A8-66897D7ADE78}"/>
+              </a:ext>
+            </a:extLst>
+          </p:cNvPr>
+          <p:cNvSpPr>
+            <a:spLocks noGrp="1"/>
+          </p:cNvSpPr>
+          <p:nvPr>
+            <p:ph idx="1"/>
+          </p:nvPr>
+        </p:nvSpPr>
+        <p:spPr/>
+        <p:txBody>
+          <a:bodyPr/>
+          <a:lstStyle/>
+          <a:p>
+            <a:r>
+              <a:rPr lang="sl-SI" b="1" dirty="0"/>
+              <a:t>program, s katerim testiramo ali </a:t>
+            </a:r>
+            <a:r>
+              <a:rPr lang="sl-SI" b="1" dirty="0" err="1"/>
+              <a:t>razhroščujemo</a:t>
+            </a:r>
+            <a:r>
+              <a:rPr lang="sl-SI" b="1" dirty="0"/>
+              <a:t> drug ("ciljni") program</a:t>
+            </a:r>
+            <a:endParaRPr lang="en-GB" b="1" dirty="0"/>
+          </a:p>
+          <a:p>
+            <a:r>
+              <a:rPr lang="en-GB" dirty="0"/>
+              <a:t>o</a:t>
+            </a:r>
+            <a:r>
+              <a:rPr lang="sl-SI" dirty="0" err="1"/>
+              <a:t>mogočajo</a:t>
+            </a:r>
+            <a:r>
+              <a:rPr lang="en-GB" dirty="0"/>
+              <a:t>:</a:t>
+            </a:r>
+          </a:p>
+          <a:p>
+            <a:pPr lvl="1"/>
+            <a:r>
+              <a:rPr lang="sl-SI" dirty="0"/>
+              <a:t> spremljanje poteka izvajanja ciljnega programa </a:t>
+            </a:r>
+            <a:endParaRPr lang="en-GB" dirty="0"/>
+          </a:p>
+          <a:p>
+            <a:pPr lvl="1"/>
+            <a:r>
+              <a:rPr lang="sl-SI" dirty="0"/>
+              <a:t>ob katerikoli točki </a:t>
+            </a:r>
+            <a:r>
+              <a:rPr lang="en-GB" dirty="0"/>
+              <a:t>la</a:t>
+            </a:r>
+            <a:r>
+              <a:rPr lang="sl-SI" dirty="0"/>
+              <a:t>h</a:t>
+            </a:r>
+            <a:r>
+              <a:rPr lang="en-GB" dirty="0" err="1"/>
+              <a:t>ko</a:t>
+            </a:r>
+            <a:r>
+              <a:rPr lang="en-GB" dirty="0"/>
+              <a:t> programmer </a:t>
+            </a:r>
+            <a:r>
+              <a:rPr lang="sl-SI" dirty="0"/>
+              <a:t>ustavi program ter pogleda stanje programa in preveri pravilnost njegovega delovanja.</a:t>
+            </a:r>
+          </a:p>
+          <a:p>
+            <a:r>
+              <a:rPr lang="sl-SI" dirty="0"/>
+              <a:t>lahko uporabljajo tudi </a:t>
+            </a:r>
+            <a:r>
+              <a:rPr lang="sl-SI" dirty="0" err="1"/>
+              <a:t>instruction</a:t>
+            </a:r>
+            <a:r>
+              <a:rPr lang="sl-SI" dirty="0"/>
+              <a:t> set simulator</a:t>
+            </a:r>
+          </a:p>
+        </p:txBody>
+      </p:sp>
+    </p:spTree>
+    <p:extLst>
+      <p:ext uri="{BB962C8B-B14F-4D97-AF65-F5344CB8AC3E}">
+        <p14:creationId xmlns:p14="http://schemas.microsoft.com/office/powerpoint/2010/main" val="2495267524"/>
       </p:ext>
     </p:extLst>
   </p:cSld>
@@ -9564,7 +8681,7 @@
         </p:spPr>
         <p:txBody>
           <a:bodyPr>
-            <a:normAutofit lnSpcReduction="10000"/>
+            <a:normAutofit/>
           </a:bodyPr>
           <a:lstStyle/>
           <a:p>
@@ -9598,15 +8715,7 @@
           <a:p>
             <a:r>
               <a:rPr lang="sl-SI" dirty="0"/>
-              <a:t>deluje z </a:t>
-            </a:r>
-            <a:r>
-              <a:rPr lang="sl-SI" dirty="0" err="1"/>
-              <a:t>večimi</a:t>
-            </a:r>
-            <a:r>
-              <a:rPr lang="sl-SI" dirty="0"/>
-              <a:t> programskimi jeziki, kot Ada, C, C++, </a:t>
+              <a:t>Ada, C, C++, </a:t>
             </a:r>
             <a:r>
               <a:rPr lang="sl-SI" dirty="0" err="1"/>
@@ -9636,7 +8745,7 @@
           <a:p>
             <a:r>
               <a:rPr lang="sl-SI" dirty="0"/>
-              <a:t>na velikem številu različnih arhitektur - X86 in X64, IA-64, ARM, </a:t>
+              <a:t>X86 in X64, IA-64, ARM, </a:t>
             </a:r>
             <a:r>
               <a:rPr lang="sl-SI" dirty="0" err="1"/>
@@ -9666,7 +8775,7 @@
           <a:p>
             <a:r>
               <a:rPr lang="sl-SI" dirty="0"/>
-              <a:t>Napisal ga je Richard </a:t>
+              <a:t>Napisal Richard </a:t>
             </a:r>
             <a:r>
               <a:rPr lang="sl-SI" dirty="0" err="1"/>

</xml_diff>

<commit_message>
Added some quick xdebug slides to the presentation.
</commit_message>
<xml_diff>
--- a/debuggers.pptx
+++ b/debuggers.pptx
@@ -36,7 +36,7 @@
     <p:sldId id="283" r:id="rId27"/>
     <p:sldId id="284" r:id="rId28"/>
     <p:sldId id="287" r:id="rId29"/>
-    <p:sldId id="288" r:id="rId30"/>
+    <p:sldId id="290" r:id="rId30"/>
     <p:sldId id="289" r:id="rId31"/>
     <p:sldId id="285" r:id="rId32"/>
   </p:sldIdLst>
@@ -178,7 +178,7 @@
             <p14:sldId id="283"/>
             <p14:sldId id="284"/>
             <p14:sldId id="287"/>
-            <p14:sldId id="288"/>
+            <p14:sldId id="290"/>
             <p14:sldId id="289"/>
             <p14:sldId id="285"/>
           </p14:sldIdLst>
@@ -198,38 +198,6 @@
     <p1510:client id="{E07EA255-8232-44D9-B308-6D05CC31048C}" v="6" dt="2018-07-18T02:35:29.166"/>
   </p1510:revLst>
 </p1510:revInfo>
-</file>
-
-<file path=ppt/changesInfos/changesInfo1.xml><?xml version="1.0" encoding="utf-8"?>
-<pc:chgInfo xmlns:a="http://schemas.openxmlformats.org/drawingml/2006/main" xmlns:r="http://schemas.openxmlformats.org/officeDocument/2006/relationships" xmlns:ac="http://schemas.microsoft.com/office/drawing/2013/main/command" xmlns:pc="http://schemas.microsoft.com/office/powerpoint/2013/main/command">
-  <pc:docChgLst>
-    <pc:chgData name="Jakob Erzar" userId="18a895aab62a8440" providerId="LiveId" clId="{9229E343-FD06-43D4-B292-7433C8E7B9CE}"/>
-  </pc:docChgLst>
-  <pc:docChgLst>
-    <pc:chgData name="Jakob Erzar" userId="18a895aab62a8440" providerId="LiveId" clId="{E07EA255-8232-44D9-B308-6D05CC31048C}"/>
-    <pc:docChg chg="modSld">
-      <pc:chgData name="Jakob Erzar" userId="18a895aab62a8440" providerId="LiveId" clId="{E07EA255-8232-44D9-B308-6D05CC31048C}" dt="2018-07-18T02:35:29.166" v="5" actId="20577"/>
-      <pc:docMkLst>
-        <pc:docMk/>
-      </pc:docMkLst>
-      <pc:sldChg chg="modSp">
-        <pc:chgData name="Jakob Erzar" userId="18a895aab62a8440" providerId="LiveId" clId="{E07EA255-8232-44D9-B308-6D05CC31048C}" dt="2018-07-18T02:35:29.166" v="5" actId="20577"/>
-        <pc:sldMkLst>
-          <pc:docMk/>
-          <pc:sldMk cId="3354056300" sldId="280"/>
-        </pc:sldMkLst>
-        <pc:spChg chg="mod">
-          <ac:chgData name="Jakob Erzar" userId="18a895aab62a8440" providerId="LiveId" clId="{E07EA255-8232-44D9-B308-6D05CC31048C}" dt="2018-07-18T02:35:29.166" v="5" actId="20577"/>
-          <ac:spMkLst>
-            <pc:docMk/>
-            <pc:sldMk cId="3354056300" sldId="280"/>
-            <ac:spMk id="3" creationId="{D1A30E5A-ADEB-41D7-9F0A-EA556FBEB2BD}"/>
-          </ac:spMkLst>
-        </pc:spChg>
-      </pc:sldChg>
-    </pc:docChg>
-  </pc:docChgLst>
-</pc:chgInfo>
 </file>
 
 <file path=ppt/notesMasters/notesMaster1.xml><?xml version="1.0" encoding="utf-8"?>
@@ -314,7 +282,7 @@
           <a:p>
             <a:fld id="{49159BA0-0305-4706-9458-C4E5E90B6282}" type="datetimeFigureOut">
               <a:rPr lang="sl-SI" smtClean="0"/>
-              <a:t>18. 07. 2018</a:t>
+              <a:t>20. 07. 2018</a:t>
             </a:fld>
             <a:endParaRPr lang="sl-SI"/>
           </a:p>
@@ -1294,7 +1262,7 @@
           <a:p>
             <a:fld id="{1160EA64-D806-43AC-9DF2-F8C432F32B4C}" type="datetimeFigureOut">
               <a:rPr lang="en-US" smtClean="0"/>
-              <a:t>7/18/2018</a:t>
+              <a:t>7/20/2018</a:t>
             </a:fld>
             <a:endParaRPr lang="en-US" dirty="0"/>
           </a:p>
@@ -1591,7 +1559,7 @@
           <a:p>
             <a:fld id="{1160EA64-D806-43AC-9DF2-F8C432F32B4C}" type="datetimeFigureOut">
               <a:rPr lang="en-US" smtClean="0"/>
-              <a:t>7/18/2018</a:t>
+              <a:t>7/20/2018</a:t>
             </a:fld>
             <a:endParaRPr lang="en-US" dirty="0"/>
           </a:p>
@@ -1841,7 +1809,7 @@
           <a:p>
             <a:fld id="{1160EA64-D806-43AC-9DF2-F8C432F32B4C}" type="datetimeFigureOut">
               <a:rPr lang="en-US" smtClean="0"/>
-              <a:t>7/18/2018</a:t>
+              <a:t>7/20/2018</a:t>
             </a:fld>
             <a:endParaRPr lang="en-US" dirty="0"/>
           </a:p>
@@ -2383,7 +2351,7 @@
           <a:p>
             <a:fld id="{1160EA64-D806-43AC-9DF2-F8C432F32B4C}" type="datetimeFigureOut">
               <a:rPr lang="en-US" smtClean="0"/>
-              <a:t>7/18/2018</a:t>
+              <a:t>7/20/2018</a:t>
             </a:fld>
             <a:endParaRPr lang="en-US" dirty="0"/>
           </a:p>
@@ -2633,7 +2601,7 @@
           <a:p>
             <a:fld id="{1160EA64-D806-43AC-9DF2-F8C432F32B4C}" type="datetimeFigureOut">
               <a:rPr lang="en-US" smtClean="0"/>
-              <a:t>7/18/2018</a:t>
+              <a:t>7/20/2018</a:t>
             </a:fld>
             <a:endParaRPr lang="en-US" dirty="0"/>
           </a:p>
@@ -3167,7 +3135,7 @@
           <a:p>
             <a:fld id="{1160EA64-D806-43AC-9DF2-F8C432F32B4C}" type="datetimeFigureOut">
               <a:rPr lang="en-US" smtClean="0"/>
-              <a:t>7/18/2018</a:t>
+              <a:t>7/20/2018</a:t>
             </a:fld>
             <a:endParaRPr lang="en-US" dirty="0"/>
           </a:p>
@@ -3466,7 +3434,7 @@
           <a:p>
             <a:fld id="{1160EA64-D806-43AC-9DF2-F8C432F32B4C}" type="datetimeFigureOut">
               <a:rPr lang="en-US" smtClean="0"/>
-              <a:t>7/18/2018</a:t>
+              <a:t>7/20/2018</a:t>
             </a:fld>
             <a:endParaRPr lang="en-US" dirty="0"/>
           </a:p>
@@ -3642,7 +3610,7 @@
           <a:p>
             <a:fld id="{E9F9C37B-1D36-470B-8223-D6C91242EC14}" type="datetimeFigureOut">
               <a:rPr lang="en-US" smtClean="0"/>
-              <a:t>7/18/2018</a:t>
+              <a:t>7/20/2018</a:t>
             </a:fld>
             <a:endParaRPr lang="en-US" dirty="0"/>
           </a:p>
@@ -3822,7 +3790,7 @@
           <a:p>
             <a:fld id="{67C6F52A-A82B-47A2-A83A-8C4C91F2D59F}" type="datetimeFigureOut">
               <a:rPr lang="en-US" smtClean="0"/>
-              <a:t>7/18/2018</a:t>
+              <a:t>7/20/2018</a:t>
             </a:fld>
             <a:endParaRPr lang="en-US" dirty="0"/>
           </a:p>
@@ -3992,7 +3960,7 @@
           <a:p>
             <a:fld id="{F070A7B3-6521-4DCA-87E5-044747A908C1}" type="datetimeFigureOut">
               <a:rPr lang="en-US" smtClean="0"/>
-              <a:t>7/18/2018</a:t>
+              <a:t>7/20/2018</a:t>
             </a:fld>
             <a:endParaRPr lang="en-US" dirty="0"/>
           </a:p>
@@ -4244,7 +4212,7 @@
           <a:p>
             <a:fld id="{1160EA64-D806-43AC-9DF2-F8C432F32B4C}" type="datetimeFigureOut">
               <a:rPr lang="en-US" smtClean="0"/>
-              <a:t>7/18/2018</a:t>
+              <a:t>7/20/2018</a:t>
             </a:fld>
             <a:endParaRPr lang="en-US" dirty="0"/>
           </a:p>
@@ -4542,7 +4510,7 @@
           <a:p>
             <a:fld id="{AB134690-1557-4C89-A502-4959FE7FAD70}" type="datetimeFigureOut">
               <a:rPr lang="en-US" smtClean="0"/>
-              <a:t>7/18/2018</a:t>
+              <a:t>7/20/2018</a:t>
             </a:fld>
             <a:endParaRPr lang="en-US" dirty="0"/>
           </a:p>
@@ -4984,7 +4952,7 @@
           <a:p>
             <a:fld id="{1160EA64-D806-43AC-9DF2-F8C432F32B4C}" type="datetimeFigureOut">
               <a:rPr lang="en-US" smtClean="0"/>
-              <a:t>7/18/2018</a:t>
+              <a:t>7/20/2018</a:t>
             </a:fld>
             <a:endParaRPr lang="en-US" dirty="0"/>
           </a:p>
@@ -5104,7 +5072,7 @@
           <a:p>
             <a:fld id="{E1037C31-9E7A-4F99-8774-A0E530DE1A42}" type="datetimeFigureOut">
               <a:rPr lang="en-US" smtClean="0"/>
-              <a:t>7/18/2018</a:t>
+              <a:t>7/20/2018</a:t>
             </a:fld>
             <a:endParaRPr lang="en-US" dirty="0"/>
           </a:p>
@@ -5199,7 +5167,7 @@
           <a:p>
             <a:fld id="{C278504F-A551-4DE0-9316-4DCD1D8CC752}" type="datetimeFigureOut">
               <a:rPr lang="en-US" smtClean="0"/>
-              <a:t>7/18/2018</a:t>
+              <a:t>7/20/2018</a:t>
             </a:fld>
             <a:endParaRPr lang="en-US" dirty="0"/>
           </a:p>
@@ -5482,7 +5450,7 @@
           <a:p>
             <a:fld id="{D1BE4249-C0D0-4B06-8692-E8BB871AF643}" type="datetimeFigureOut">
               <a:rPr lang="en-US" smtClean="0"/>
-              <a:t>7/18/2018</a:t>
+              <a:t>7/20/2018</a:t>
             </a:fld>
             <a:endParaRPr lang="en-US" dirty="0"/>
           </a:p>
@@ -5773,7 +5741,7 @@
           <a:p>
             <a:fld id="{042B0DB6-F5C7-45FB-8CF3-31B45F9C2DAC}" type="datetimeFigureOut">
               <a:rPr lang="en-US" smtClean="0"/>
-              <a:t>7/18/2018</a:t>
+              <a:t>7/20/2018</a:t>
             </a:fld>
             <a:endParaRPr lang="en-US" dirty="0"/>
           </a:p>
@@ -6303,7 +6271,7 @@
           <a:p>
             <a:fld id="{1160EA64-D806-43AC-9DF2-F8C432F32B4C}" type="datetimeFigureOut">
               <a:rPr lang="en-US" smtClean="0"/>
-              <a:t>7/18/2018</a:t>
+              <a:t>7/20/2018</a:t>
             </a:fld>
             <a:endParaRPr lang="en-US" dirty="0"/>
           </a:p>
@@ -10302,6 +10270,17 @@
               <a:rPr lang="sl-SI" dirty="0"/>
               <a:t>2 pa nov, DBGP</a:t>
             </a:r>
+          </a:p>
+          <a:p>
+            <a:r>
+              <a:rPr lang="sl-SI" dirty="0">
+                <a:hlinkClick r:id="rId2"/>
+              </a:rPr>
+              <a:t>https://xdebug.org/docs/remote</a:t>
+            </a:r>
+            <a:endParaRPr lang="sl-SI" dirty="0"/>
+          </a:p>
+          <a:p>
             <a:endParaRPr lang="sl-SI" b="1" dirty="0"/>
           </a:p>
         </p:txBody>
@@ -10341,7 +10320,7 @@
           <p:cNvPr id="2" name="Title 1">
             <a:extLst>
               <a:ext uri="{FF2B5EF4-FFF2-40B4-BE49-F238E27FC236}">
-                <a16:creationId xmlns:a16="http://schemas.microsoft.com/office/drawing/2014/main" id="{B6E64E22-CFEF-44A5-B821-0F2ED07DB2D8}"/>
+                <a16:creationId xmlns:a16="http://schemas.microsoft.com/office/drawing/2014/main" id="{E2959BAA-C296-465E-8736-C5A1370E4F3F}"/>
               </a:ext>
             </a:extLst>
           </p:cNvPr>
@@ -10357,45 +10336,70 @@
           <a:bodyPr/>
           <a:lstStyle/>
           <a:p>
-            <a:endParaRPr lang="sl-SI"/>
-          </a:p>
-        </p:txBody>
-      </p:sp>
-      <p:sp>
-        <p:nvSpPr>
-          <p:cNvPr id="7" name="Content Placeholder 6">
+            <a:r>
+              <a:rPr lang="sl-SI" dirty="0"/>
+              <a:t>PHP </a:t>
+            </a:r>
+            <a:r>
+              <a:rPr lang="sl-SI" dirty="0" err="1"/>
+              <a:t>Execution</a:t>
+            </a:r>
+            <a:r>
+              <a:rPr lang="sl-SI" dirty="0"/>
+              <a:t> </a:t>
+            </a:r>
+            <a:r>
+              <a:rPr lang="sl-SI" dirty="0" err="1"/>
+              <a:t>Life</a:t>
+            </a:r>
+            <a:r>
+              <a:rPr lang="sl-SI" dirty="0"/>
+              <a:t> </a:t>
+            </a:r>
+            <a:r>
+              <a:rPr lang="sl-SI" dirty="0" err="1"/>
+              <a:t>Cycle</a:t>
+            </a:r>
+            <a:endParaRPr lang="sl-SI" dirty="0"/>
+          </a:p>
+        </p:txBody>
+      </p:sp>
+      <p:pic>
+        <p:nvPicPr>
+          <p:cNvPr id="4" name="Content Placeholder 3">
             <a:extLst>
               <a:ext uri="{FF2B5EF4-FFF2-40B4-BE49-F238E27FC236}">
-                <a16:creationId xmlns:a16="http://schemas.microsoft.com/office/drawing/2014/main" id="{A4588CC7-6A00-4AD6-904F-574682655999}"/>
+                <a16:creationId xmlns:a16="http://schemas.microsoft.com/office/drawing/2014/main" id="{DB52DAEE-05CE-4DD0-8E31-6A0D01B694B4}"/>
               </a:ext>
             </a:extLst>
           </p:cNvPr>
-          <p:cNvSpPr>
-            <a:spLocks noGrp="1"/>
-          </p:cNvSpPr>
+          <p:cNvPicPr>
+            <a:picLocks noGrp="1" noChangeAspect="1"/>
+          </p:cNvPicPr>
           <p:nvPr>
             <p:ph idx="1"/>
           </p:nvPr>
-        </p:nvSpPr>
-        <p:spPr/>
-        <p:txBody>
-          <a:bodyPr/>
-          <a:lstStyle/>
-          <a:p>
-            <a:r>
-              <a:rPr lang="sl-SI" dirty="0">
-                <a:hlinkClick r:id="rId2"/>
-              </a:rPr>
-              <a:t>https://xdebug.org/docs/remote</a:t>
-            </a:r>
-            <a:endParaRPr lang="sl-SI" dirty="0"/>
-          </a:p>
-        </p:txBody>
-      </p:sp>
+        </p:nvPicPr>
+        <p:blipFill>
+          <a:blip r:embed="rId2"/>
+          <a:stretch>
+            <a:fillRect/>
+          </a:stretch>
+        </p:blipFill>
+        <p:spPr>
+          <a:xfrm>
+            <a:off x="3657600" y="2082601"/>
+            <a:ext cx="4992914" cy="4568920"/>
+          </a:xfrm>
+          <a:prstGeom prst="rect">
+            <a:avLst/>
+          </a:prstGeom>
+        </p:spPr>
+      </p:pic>
     </p:spTree>
     <p:extLst>
       <p:ext uri="{BB962C8B-B14F-4D97-AF65-F5344CB8AC3E}">
-        <p14:creationId xmlns:p14="http://schemas.microsoft.com/office/powerpoint/2010/main" val="3494212855"/>
+        <p14:creationId xmlns:p14="http://schemas.microsoft.com/office/powerpoint/2010/main" val="176933570"/>
       </p:ext>
     </p:extLst>
   </p:cSld>
@@ -10581,11 +10585,11 @@
           <a:lstStyle/>
           <a:p>
             <a:r>
-              <a:rPr lang="sl-SI"/>
+              <a:rPr lang="sl-SI" dirty="0"/>
               <a:t>Demo </a:t>
             </a:r>
             <a:r>
-              <a:rPr lang="sl-SI">
+              <a:rPr lang="sl-SI" dirty="0">
                 <a:sym typeface="Wingdings" panose="05000000000000000000" pitchFamily="2" charset="2"/>
               </a:rPr>
               <a:t></a:t>

</xml_diff>